<commit_message>
Vjezbe i prezentacija za sesiju 21
</commit_message>
<xml_diff>
--- a/sesija-21/PPT/Front-End Developer-21.pptx
+++ b/sesija-21/PPT/Front-End Developer-21.pptx
@@ -6,13 +6,33 @@
     <p:sldMasterId id="2147483676" r:id="rId2"/>
   </p:sldMasterIdLst>
   <p:notesMasterIdLst>
-    <p:notesMasterId r:id="rId7"/>
+    <p:notesMasterId r:id="rId27"/>
   </p:notesMasterIdLst>
   <p:sldIdLst>
     <p:sldId id="256" r:id="rId3"/>
     <p:sldId id="257" r:id="rId4"/>
     <p:sldId id="258" r:id="rId5"/>
-    <p:sldId id="263" r:id="rId6"/>
+    <p:sldId id="264" r:id="rId6"/>
+    <p:sldId id="277" r:id="rId7"/>
+    <p:sldId id="282" r:id="rId8"/>
+    <p:sldId id="265" r:id="rId9"/>
+    <p:sldId id="281" r:id="rId10"/>
+    <p:sldId id="278" r:id="rId11"/>
+    <p:sldId id="280" r:id="rId12"/>
+    <p:sldId id="286" r:id="rId13"/>
+    <p:sldId id="279" r:id="rId14"/>
+    <p:sldId id="287" r:id="rId15"/>
+    <p:sldId id="289" r:id="rId16"/>
+    <p:sldId id="288" r:id="rId17"/>
+    <p:sldId id="269" r:id="rId18"/>
+    <p:sldId id="283" r:id="rId19"/>
+    <p:sldId id="270" r:id="rId20"/>
+    <p:sldId id="272" r:id="rId21"/>
+    <p:sldId id="284" r:id="rId22"/>
+    <p:sldId id="285" r:id="rId23"/>
+    <p:sldId id="276" r:id="rId24"/>
+    <p:sldId id="273" r:id="rId25"/>
+    <p:sldId id="275" r:id="rId26"/>
   </p:sldIdLst>
   <p:sldSz cx="12192000" cy="6858000"/>
   <p:notesSz cx="6858000" cy="9144000"/>
@@ -119,7 +139,27 @@
             <p14:sldId id="256"/>
             <p14:sldId id="257"/>
             <p14:sldId id="258"/>
-            <p14:sldId id="263"/>
+            <p14:sldId id="264"/>
+            <p14:sldId id="277"/>
+            <p14:sldId id="282"/>
+            <p14:sldId id="265"/>
+            <p14:sldId id="281"/>
+            <p14:sldId id="278"/>
+            <p14:sldId id="280"/>
+            <p14:sldId id="286"/>
+            <p14:sldId id="279"/>
+            <p14:sldId id="287"/>
+            <p14:sldId id="289"/>
+            <p14:sldId id="288"/>
+            <p14:sldId id="269"/>
+            <p14:sldId id="283"/>
+            <p14:sldId id="270"/>
+            <p14:sldId id="272"/>
+            <p14:sldId id="284"/>
+            <p14:sldId id="285"/>
+            <p14:sldId id="276"/>
+            <p14:sldId id="273"/>
+            <p14:sldId id="275"/>
           </p14:sldIdLst>
         </p14:section>
       </p14:sectionLst>
@@ -903,10 +943,10 @@
         <a:lstStyle/>
         <a:p>
           <a:r>
-            <a:rPr lang="en-US" b="1" smtClean="0"/>
-            <a:t>HTML</a:t>
+            <a:rPr lang="en-US" b="1" dirty="0" smtClean="0"/>
+            <a:t>CSS</a:t>
           </a:r>
-          <a:endParaRPr lang="en-US"/>
+          <a:endParaRPr lang="en-US" dirty="0"/>
         </a:p>
       </dgm:t>
     </dgm:pt>
@@ -931,25 +971,6 @@
           <a:endParaRPr lang="en-US"/>
         </a:p>
       </dgm:t>
-    </dgm:pt>
-    <dgm:pt modelId="{7BA3726F-3900-4FC3-8B1E-5B513F942281}">
-      <dgm:prSet phldrT="[Text]"/>
-      <dgm:spPr/>
-      <dgm:t>
-        <a:bodyPr/>
-        <a:lstStyle/>
-        <a:p>
-          <a:endParaRPr lang="en-US"/>
-        </a:p>
-      </dgm:t>
-    </dgm:pt>
-    <dgm:pt modelId="{F89418B0-7D47-48D3-A0DD-7DC00E292A1E}" type="parTrans" cxnId="{C78D7D1E-4353-489A-8F01-856C716DDAA5}">
-      <dgm:prSet/>
-      <dgm:spPr/>
-    </dgm:pt>
-    <dgm:pt modelId="{B8A6BCFB-F597-4971-BF20-6B7B52347AE9}" type="sibTrans" cxnId="{C78D7D1E-4353-489A-8F01-856C716DDAA5}">
-      <dgm:prSet/>
-      <dgm:spPr/>
     </dgm:pt>
     <dgm:pt modelId="{AEABCDDF-3180-4C76-A7CB-FC0B6AF0719A}" type="pres">
       <dgm:prSet presAssocID="{4EE1351B-4B79-4D48-8F5E-455F7AD945A8}" presName="linear" presStyleCnt="0">
@@ -983,30 +1004,12 @@
         </a:p>
       </dgm:t>
     </dgm:pt>
-    <dgm:pt modelId="{AADBD8E6-695F-4FE3-9A02-D807BC812A7C}" type="pres">
-      <dgm:prSet presAssocID="{01EB205F-FC18-44EF-B4D7-07083A382D6D}" presName="childText" presStyleLbl="revTx" presStyleIdx="0" presStyleCnt="1">
-        <dgm:presLayoutVars>
-          <dgm:bulletEnabled val="1"/>
-        </dgm:presLayoutVars>
-      </dgm:prSet>
-      <dgm:spPr/>
-      <dgm:t>
-        <a:bodyPr/>
-        <a:lstStyle/>
-        <a:p>
-          <a:endParaRPr lang="en-US"/>
-        </a:p>
-      </dgm:t>
-    </dgm:pt>
   </dgm:ptLst>
   <dgm:cxnLst>
-    <dgm:cxn modelId="{C5A8E9B4-A897-4242-BCB6-414B02FAC18D}" type="presOf" srcId="{7BA3726F-3900-4FC3-8B1E-5B513F942281}" destId="{AADBD8E6-695F-4FE3-9A02-D807BC812A7C}" srcOrd="0" destOrd="0" presId="urn:microsoft.com/office/officeart/2005/8/layout/vList2"/>
     <dgm:cxn modelId="{FB3F133B-D980-4586-8A93-14087C2AFDB7}" type="presOf" srcId="{01EB205F-FC18-44EF-B4D7-07083A382D6D}" destId="{F4D94EE2-DE87-41D3-8995-9FDA4ED2D4BE}" srcOrd="0" destOrd="0" presId="urn:microsoft.com/office/officeart/2005/8/layout/vList2"/>
-    <dgm:cxn modelId="{C78D7D1E-4353-489A-8F01-856C716DDAA5}" srcId="{01EB205F-FC18-44EF-B4D7-07083A382D6D}" destId="{7BA3726F-3900-4FC3-8B1E-5B513F942281}" srcOrd="0" destOrd="0" parTransId="{F89418B0-7D47-48D3-A0DD-7DC00E292A1E}" sibTransId="{B8A6BCFB-F597-4971-BF20-6B7B52347AE9}"/>
     <dgm:cxn modelId="{554D4833-0D13-4D4C-92BF-76D83AECFDE6}" srcId="{4EE1351B-4B79-4D48-8F5E-455F7AD945A8}" destId="{01EB205F-FC18-44EF-B4D7-07083A382D6D}" srcOrd="0" destOrd="0" parTransId="{D4C6F2B3-566C-488E-AC05-F7BDFB6B7331}" sibTransId="{2BF717F9-FCD3-4CE3-A0A5-83D104AFB328}"/>
     <dgm:cxn modelId="{9ADF0326-01FB-4790-B759-ACDFB0217796}" type="presOf" srcId="{4EE1351B-4B79-4D48-8F5E-455F7AD945A8}" destId="{AEABCDDF-3180-4C76-A7CB-FC0B6AF0719A}" srcOrd="0" destOrd="0" presId="urn:microsoft.com/office/officeart/2005/8/layout/vList2"/>
     <dgm:cxn modelId="{541BD5B9-51DA-497F-838D-CDA31366E980}" type="presParOf" srcId="{AEABCDDF-3180-4C76-A7CB-FC0B6AF0719A}" destId="{F4D94EE2-DE87-41D3-8995-9FDA4ED2D4BE}" srcOrd="0" destOrd="0" presId="urn:microsoft.com/office/officeart/2005/8/layout/vList2"/>
-    <dgm:cxn modelId="{C7801D2E-7067-4E56-86BD-8C707C34363A}" type="presParOf" srcId="{AEABCDDF-3180-4C76-A7CB-FC0B6AF0719A}" destId="{AADBD8E6-695F-4FE3-9A02-D807BC812A7C}" srcOrd="1" destOrd="0" presId="urn:microsoft.com/office/officeart/2005/8/layout/vList2"/>
   </dgm:cxnLst>
   <dgm:bg/>
   <dgm:whole/>
@@ -1033,7 +1036,7 @@
       </dsp:nvSpPr>
       <dsp:spPr>
         <a:xfrm>
-          <a:off x="0" y="1548347"/>
+          <a:off x="0" y="2086548"/>
           <a:ext cx="8298873" cy="1521000"/>
         </a:xfrm>
         <a:prstGeom prst="roundRect">
@@ -1092,72 +1095,15 @@
             </a:spcAft>
           </a:pPr>
           <a:r>
-            <a:rPr lang="en-US" sz="6500" b="1" kern="1200" smtClean="0"/>
-            <a:t>HTML</a:t>
+            <a:rPr lang="en-US" sz="6500" b="1" kern="1200" dirty="0" smtClean="0"/>
+            <a:t>CSS</a:t>
           </a:r>
-          <a:endParaRPr lang="en-US" sz="6500" kern="1200"/>
+          <a:endParaRPr lang="en-US" sz="6500" kern="1200" dirty="0"/>
         </a:p>
       </dsp:txBody>
       <dsp:txXfrm>
-        <a:off x="74249" y="1622596"/>
+        <a:off x="74249" y="2160797"/>
         <a:ext cx="8150375" cy="1372502"/>
-      </dsp:txXfrm>
-    </dsp:sp>
-    <dsp:sp modelId="{AADBD8E6-695F-4FE3-9A02-D807BC812A7C}">
-      <dsp:nvSpPr>
-        <dsp:cNvPr id="0" name=""/>
-        <dsp:cNvSpPr/>
-      </dsp:nvSpPr>
-      <dsp:spPr>
-        <a:xfrm>
-          <a:off x="0" y="3069347"/>
-          <a:ext cx="8298873" cy="1076400"/>
-        </a:xfrm>
-        <a:prstGeom prst="rect">
-          <a:avLst/>
-        </a:prstGeom>
-        <a:noFill/>
-        <a:ln>
-          <a:noFill/>
-        </a:ln>
-        <a:effectLst/>
-      </dsp:spPr>
-      <dsp:style>
-        <a:lnRef idx="0">
-          <a:scrgbClr r="0" g="0" b="0"/>
-        </a:lnRef>
-        <a:fillRef idx="0">
-          <a:scrgbClr r="0" g="0" b="0"/>
-        </a:fillRef>
-        <a:effectRef idx="0">
-          <a:scrgbClr r="0" g="0" b="0"/>
-        </a:effectRef>
-        <a:fontRef idx="minor"/>
-      </dsp:style>
-      <dsp:txBody>
-        <a:bodyPr spcFirstLastPara="0" vert="horz" wrap="square" lIns="263489" tIns="82550" rIns="462280" bIns="82550" numCol="1" spcCol="1270" anchor="t" anchorCtr="0">
-          <a:noAutofit/>
-        </a:bodyPr>
-        <a:lstStyle/>
-        <a:p>
-          <a:pPr marL="285750" lvl="1" indent="-285750" algn="l" defTabSz="2266950">
-            <a:lnSpc>
-              <a:spcPct val="90000"/>
-            </a:lnSpc>
-            <a:spcBef>
-              <a:spcPct val="0"/>
-            </a:spcBef>
-            <a:spcAft>
-              <a:spcPct val="20000"/>
-            </a:spcAft>
-            <a:buChar char="••"/>
-          </a:pPr>
-          <a:endParaRPr lang="en-US" sz="5100" kern="1200"/>
-        </a:p>
-      </dsp:txBody>
-      <dsp:txXfrm>
-        <a:off x="0" y="3069347"/>
-        <a:ext cx="8298873" cy="1076400"/>
       </dsp:txXfrm>
     </dsp:sp>
   </dsp:spTree>
@@ -2447,7 +2393,7 @@
           <a:p>
             <a:fld id="{D32AC403-8EB1-4D4E-8C3A-24BD19820531}" type="datetimeFigureOut">
               <a:rPr lang="en-US" smtClean="0"/>
-              <a:t>13-Mar-18</a:t>
+              <a:t>3/28/2018</a:t>
             </a:fld>
             <a:endParaRPr lang="en-US"/>
           </a:p>
@@ -2715,6 +2661,269 @@
 </p:notesMaster>
 </file>
 
+<file path=ppt/notesSlides/notesSlide1.xml><?xml version="1.0" encoding="utf-8"?>
+<p:notes xmlns:a="http://schemas.openxmlformats.org/drawingml/2006/main" xmlns:r="http://schemas.openxmlformats.org/officeDocument/2006/relationships" xmlns:p="http://schemas.openxmlformats.org/presentationml/2006/main">
+  <p:cSld>
+    <p:spTree>
+      <p:nvGrpSpPr>
+        <p:cNvPr id="1" name=""/>
+        <p:cNvGrpSpPr/>
+        <p:nvPr/>
+      </p:nvGrpSpPr>
+      <p:grpSpPr>
+        <a:xfrm>
+          <a:off x="0" y="0"/>
+          <a:ext cx="0" cy="0"/>
+          <a:chOff x="0" y="0"/>
+          <a:chExt cx="0" cy="0"/>
+        </a:xfrm>
+      </p:grpSpPr>
+      <p:sp>
+        <p:nvSpPr>
+          <p:cNvPr id="2" name="Slide Image Placeholder 1"/>
+          <p:cNvSpPr>
+            <a:spLocks noGrp="1" noRot="1" noChangeAspect="1"/>
+          </p:cNvSpPr>
+          <p:nvPr>
+            <p:ph type="sldImg"/>
+          </p:nvPr>
+        </p:nvSpPr>
+        <p:spPr/>
+      </p:sp>
+      <p:sp>
+        <p:nvSpPr>
+          <p:cNvPr id="3" name="Notes Placeholder 2"/>
+          <p:cNvSpPr>
+            <a:spLocks noGrp="1"/>
+          </p:cNvSpPr>
+          <p:nvPr>
+            <p:ph type="body" idx="1"/>
+          </p:nvPr>
+        </p:nvSpPr>
+        <p:spPr/>
+        <p:txBody>
+          <a:bodyPr/>
+          <a:lstStyle/>
+          <a:p>
+            <a:r>
+              <a:rPr lang="en-US" dirty="0" smtClean="0"/>
+              <a:t>https://www.w3.org/Style/CSS/</a:t>
+            </a:r>
+          </a:p>
+          <a:p>
+            <a:endParaRPr lang="en-US" dirty="0" smtClean="0"/>
+          </a:p>
+          <a:p>
+            <a:r>
+              <a:rPr lang="en-US" dirty="0" smtClean="0"/>
+              <a:t>The CSS 1 specification was completed in 1996. Microsoft's Internet Explorer 3[19] was released in that year, featuring some limited support for CSS. IE 4 and Netscape 4.x added more support, but it was typically incomplete and had many bugs that prevented CSS from being usefully adopted. It was more than three years before any web browser achieved near-full implementation of the specification.</a:t>
+            </a:r>
+          </a:p>
+          <a:p>
+            <a:endParaRPr lang="en-US" dirty="0" smtClean="0"/>
+          </a:p>
+          <a:p>
+            <a:r>
+              <a:rPr lang="en-US" dirty="0" smtClean="0"/>
+              <a:t>CSS 1: The first CSS specification to become an official W3C Recommendation is CSS level 1, published on December 17, 1996. </a:t>
+            </a:r>
+          </a:p>
+          <a:p>
+            <a:r>
+              <a:rPr lang="en-US" dirty="0" smtClean="0"/>
+              <a:t>Among its capabilities are support for:</a:t>
+            </a:r>
+          </a:p>
+          <a:p>
+            <a:pPr marL="171450" indent="-171450">
+              <a:buFont typeface="Arial" panose="020B0604020202020204" pitchFamily="34" charset="0"/>
+              <a:buChar char="•"/>
+            </a:pPr>
+            <a:r>
+              <a:rPr lang="en-US" dirty="0" smtClean="0"/>
+              <a:t>Font properties such as typeface and emphasis</a:t>
+            </a:r>
+          </a:p>
+          <a:p>
+            <a:pPr marL="171450" indent="-171450">
+              <a:buFont typeface="Arial" panose="020B0604020202020204" pitchFamily="34" charset="0"/>
+              <a:buChar char="•"/>
+            </a:pPr>
+            <a:r>
+              <a:rPr lang="en-US" dirty="0" smtClean="0"/>
+              <a:t>Color of text, backgrounds, and other elements</a:t>
+            </a:r>
+          </a:p>
+          <a:p>
+            <a:pPr marL="171450" indent="-171450">
+              <a:buFont typeface="Arial" panose="020B0604020202020204" pitchFamily="34" charset="0"/>
+              <a:buChar char="•"/>
+            </a:pPr>
+            <a:r>
+              <a:rPr lang="en-US" dirty="0" smtClean="0"/>
+              <a:t>Text attributes such as spacing between words, letters, and lines of text</a:t>
+            </a:r>
+          </a:p>
+          <a:p>
+            <a:pPr marL="171450" indent="-171450">
+              <a:buFont typeface="Arial" panose="020B0604020202020204" pitchFamily="34" charset="0"/>
+              <a:buChar char="•"/>
+            </a:pPr>
+            <a:r>
+              <a:rPr lang="en-US" dirty="0" smtClean="0"/>
+              <a:t>Alignment of text, images, tables and other elements</a:t>
+            </a:r>
+          </a:p>
+          <a:p>
+            <a:pPr marL="171450" indent="-171450">
+              <a:buFont typeface="Arial" panose="020B0604020202020204" pitchFamily="34" charset="0"/>
+              <a:buChar char="•"/>
+            </a:pPr>
+            <a:r>
+              <a:rPr lang="en-US" dirty="0" smtClean="0"/>
+              <a:t>Margin, border, padding, and positioning for most elements</a:t>
+            </a:r>
+          </a:p>
+          <a:p>
+            <a:pPr marL="171450" indent="-171450">
+              <a:buFont typeface="Arial" panose="020B0604020202020204" pitchFamily="34" charset="0"/>
+              <a:buChar char="•"/>
+            </a:pPr>
+            <a:r>
+              <a:rPr lang="en-US" dirty="0" smtClean="0"/>
+              <a:t>Unique identification and generic classification of groups of attributes</a:t>
+            </a:r>
+          </a:p>
+          <a:p>
+            <a:pPr marL="0" indent="0">
+              <a:buFont typeface="Arial" panose="020B0604020202020204" pitchFamily="34" charset="0"/>
+              <a:buNone/>
+            </a:pPr>
+            <a:r>
+              <a:rPr lang="en-US" dirty="0" smtClean="0"/>
+              <a:t>The W3C no longer maintains the CSS 1 Recommendation.</a:t>
+            </a:r>
+          </a:p>
+          <a:p>
+            <a:pPr marL="0" indent="0">
+              <a:buFont typeface="Arial" panose="020B0604020202020204" pitchFamily="34" charset="0"/>
+              <a:buNone/>
+            </a:pPr>
+            <a:endParaRPr lang="en-US" dirty="0" smtClean="0"/>
+          </a:p>
+          <a:p>
+            <a:pPr marL="0" indent="0">
+              <a:buFont typeface="Arial" panose="020B0604020202020204" pitchFamily="34" charset="0"/>
+              <a:buNone/>
+            </a:pPr>
+            <a:r>
+              <a:rPr lang="en-US" dirty="0" smtClean="0"/>
+              <a:t>CSS 2</a:t>
+            </a:r>
+          </a:p>
+          <a:p>
+            <a:pPr marL="0" indent="0">
+              <a:buFont typeface="Arial" panose="020B0604020202020204" pitchFamily="34" charset="0"/>
+              <a:buNone/>
+            </a:pPr>
+            <a:r>
+              <a:rPr lang="en-US" dirty="0" smtClean="0"/>
+              <a:t>CSS level 2 specification was developed by the W3C and published as a recommendation in May 1998. A superset of CSS 1, CSS 2 includes a number of new capabilities like absolute, relative, and fixed positioning of elements and z-index, the concept of media types, support for aural style sheets (which were later replaced by the CSS 3 speech modules)[39] and bidirectional text, and new font properties such as shadows.</a:t>
+            </a:r>
+          </a:p>
+          <a:p>
+            <a:pPr marL="0" indent="0">
+              <a:buFont typeface="Arial" panose="020B0604020202020204" pitchFamily="34" charset="0"/>
+              <a:buNone/>
+            </a:pPr>
+            <a:r>
+              <a:rPr lang="en-US" dirty="0" smtClean="0"/>
+              <a:t>The W3C no longer maintains the CSS 2 recommendation.</a:t>
+            </a:r>
+          </a:p>
+          <a:p>
+            <a:pPr marL="0" indent="0">
+              <a:buFont typeface="Arial" panose="020B0604020202020204" pitchFamily="34" charset="0"/>
+              <a:buNone/>
+            </a:pPr>
+            <a:endParaRPr lang="en-US" dirty="0" smtClean="0"/>
+          </a:p>
+          <a:p>
+            <a:pPr marL="0" indent="0">
+              <a:buFont typeface="Arial" panose="020B0604020202020204" pitchFamily="34" charset="0"/>
+              <a:buNone/>
+            </a:pPr>
+            <a:r>
+              <a:rPr lang="en-US" dirty="0" smtClean="0"/>
+              <a:t>CSS 3:</a:t>
+            </a:r>
+            <a:r>
+              <a:rPr lang="en-US" baseline="0" dirty="0" smtClean="0"/>
+              <a:t> </a:t>
+            </a:r>
+            <a:r>
+              <a:rPr lang="en-US" dirty="0" smtClean="0"/>
+              <a:t>Unlike CSS 2, which is a large single specification defining various features, CSS 3 is divided into several separate documents called "modules". Each module adds new capabilities or extends features defined in CSS 2, preserving backward compatibility. Work on CSS level 3 started around the time of publication of the original CSS 2 recommendation. </a:t>
+            </a:r>
+          </a:p>
+          <a:p>
+            <a:pPr marL="0" indent="0">
+              <a:buFont typeface="Arial" panose="020B0604020202020204" pitchFamily="34" charset="0"/>
+              <a:buNone/>
+            </a:pPr>
+            <a:r>
+              <a:rPr lang="en-US" dirty="0" smtClean="0"/>
+              <a:t>The earliest CSS 3 drafts were published in June 1999.</a:t>
+            </a:r>
+          </a:p>
+          <a:p>
+            <a:pPr marL="0" indent="0">
+              <a:buFont typeface="Arial" panose="020B0604020202020204" pitchFamily="34" charset="0"/>
+              <a:buNone/>
+            </a:pPr>
+            <a:r>
+              <a:rPr lang="en-US" dirty="0" smtClean="0"/>
+              <a:t>Due to the modularization, different modules have different stability and statuses.</a:t>
+            </a:r>
+          </a:p>
+        </p:txBody>
+      </p:sp>
+      <p:sp>
+        <p:nvSpPr>
+          <p:cNvPr id="4" name="Slide Number Placeholder 3"/>
+          <p:cNvSpPr>
+            <a:spLocks noGrp="1"/>
+          </p:cNvSpPr>
+          <p:nvPr>
+            <p:ph type="sldNum" sz="quarter" idx="10"/>
+          </p:nvPr>
+        </p:nvSpPr>
+        <p:spPr/>
+        <p:txBody>
+          <a:bodyPr/>
+          <a:lstStyle/>
+          <a:p>
+            <a:fld id="{C53670EE-8D87-4DCA-A75C-57CFF257AC9C}" type="slidenum">
+              <a:rPr lang="en-US" smtClean="0"/>
+              <a:t>4</a:t>
+            </a:fld>
+            <a:endParaRPr lang="en-US"/>
+          </a:p>
+        </p:txBody>
+      </p:sp>
+    </p:spTree>
+    <p:extLst>
+      <p:ext uri="{BB962C8B-B14F-4D97-AF65-F5344CB8AC3E}">
+        <p14:creationId xmlns:p14="http://schemas.microsoft.com/office/powerpoint/2010/main" val="1070313101"/>
+      </p:ext>
+    </p:extLst>
+  </p:cSld>
+  <p:clrMapOvr>
+    <a:masterClrMapping/>
+  </p:clrMapOvr>
+</p:notes>
+</file>
+
 <file path=ppt/slideLayouts/slideLayout1.xml><?xml version="1.0" encoding="utf-8"?>
 <p:sldLayout xmlns:a="http://schemas.openxmlformats.org/drawingml/2006/main" xmlns:r="http://schemas.openxmlformats.org/officeDocument/2006/relationships" xmlns:p="http://schemas.openxmlformats.org/presentationml/2006/main" type="title">
   <p:cSld name="Title Slide">
@@ -3193,7 +3402,7 @@
           <a:p>
             <a:fld id="{B35B300D-7DF5-4E96-8AA6-60E94C6E9F44}" type="datetimeFigureOut">
               <a:rPr lang="sr-Latn-RS" smtClean="0"/>
-              <a:t>13.3.2018.</a:t>
+              <a:t>28.3.2018.</a:t>
             </a:fld>
             <a:endParaRPr lang="sr-Latn-RS"/>
           </a:p>
@@ -3627,7 +3836,7 @@
           <a:p>
             <a:fld id="{B35B300D-7DF5-4E96-8AA6-60E94C6E9F44}" type="datetimeFigureOut">
               <a:rPr lang="sr-Latn-RS" smtClean="0"/>
-              <a:t>13.3.2018.</a:t>
+              <a:t>28.3.2018.</a:t>
             </a:fld>
             <a:endParaRPr lang="sr-Latn-RS"/>
           </a:p>
@@ -4001,7 +4210,7 @@
           <a:p>
             <a:fld id="{B35B300D-7DF5-4E96-8AA6-60E94C6E9F44}" type="datetimeFigureOut">
               <a:rPr lang="sr-Latn-RS" smtClean="0"/>
-              <a:t>13.3.2018.</a:t>
+              <a:t>28.3.2018.</a:t>
             </a:fld>
             <a:endParaRPr lang="sr-Latn-RS"/>
           </a:p>
@@ -4285,7 +4494,7 @@
           <a:p>
             <a:fld id="{B35B300D-7DF5-4E96-8AA6-60E94C6E9F44}" type="datetimeFigureOut">
               <a:rPr lang="sr-Latn-RS" smtClean="0"/>
-              <a:t>13.3.2018.</a:t>
+              <a:t>28.3.2018.</a:t>
             </a:fld>
             <a:endParaRPr lang="sr-Latn-RS"/>
           </a:p>
@@ -4462,7 +4671,7 @@
           <a:p>
             <a:fld id="{B35B300D-7DF5-4E96-8AA6-60E94C6E9F44}" type="datetimeFigureOut">
               <a:rPr lang="sr-Latn-RS" smtClean="0"/>
-              <a:t>13.3.2018.</a:t>
+              <a:t>28.3.2018.</a:t>
             </a:fld>
             <a:endParaRPr lang="sr-Latn-RS"/>
           </a:p>
@@ -4649,7 +4858,7 @@
           <a:p>
             <a:fld id="{B35B300D-7DF5-4E96-8AA6-60E94C6E9F44}" type="datetimeFigureOut">
               <a:rPr lang="sr-Latn-RS" smtClean="0"/>
-              <a:t>13.3.2018.</a:t>
+              <a:t>28.3.2018.</a:t>
             </a:fld>
             <a:endParaRPr lang="sr-Latn-RS"/>
           </a:p>
@@ -4896,7 +5105,7 @@
           <a:p>
             <a:fld id="{B35B300D-7DF5-4E96-8AA6-60E94C6E9F44}" type="datetimeFigureOut">
               <a:rPr lang="sr-Latn-RS" smtClean="0"/>
-              <a:t>13.3.2018.</a:t>
+              <a:t>28.3.2018.</a:t>
             </a:fld>
             <a:endParaRPr lang="sr-Latn-RS"/>
           </a:p>
@@ -5180,7 +5389,7 @@
           <a:p>
             <a:fld id="{B35B300D-7DF5-4E96-8AA6-60E94C6E9F44}" type="datetimeFigureOut">
               <a:rPr lang="sr-Latn-RS" smtClean="0"/>
-              <a:t>13.3.2018.</a:t>
+              <a:t>28.3.2018.</a:t>
             </a:fld>
             <a:endParaRPr lang="sr-Latn-RS"/>
           </a:p>
@@ -5692,23 +5901,28 @@
           </a:lstStyle>
           <a:p>
             <a:r>
-              <a:rPr lang="en-US" sz="3600" smtClean="0"/>
+              <a:rPr lang="en-US" sz="3600" dirty="0" err="1" smtClean="0"/>
               <a:t>Lekcija</a:t>
             </a:r>
-          </a:p>
-          <a:p>
-            <a:endParaRPr lang="en-US" sz="3600" smtClean="0"/>
-          </a:p>
-          <a:p>
-            <a:r>
-              <a:rPr lang="en-US" sz="3600" smtClean="0"/>
+            <a:endParaRPr lang="en-US" sz="3600" dirty="0" smtClean="0"/>
+          </a:p>
+          <a:p>
+            <a:endParaRPr lang="en-US" sz="3600" dirty="0" smtClean="0"/>
+          </a:p>
+          <a:p>
+            <a:r>
+              <a:rPr lang="en-US" sz="3600" dirty="0" smtClean="0"/>
               <a:t>CSS</a:t>
             </a:r>
             <a:r>
-              <a:rPr lang="en-US" sz="3600" baseline="0" smtClean="0"/>
-              <a:t> - osnove</a:t>
-            </a:r>
-            <a:endParaRPr lang="sr-Latn-RS" sz="3600"/>
+              <a:rPr lang="en-US" sz="3600" baseline="0" dirty="0" smtClean="0"/>
+              <a:t> - </a:t>
+            </a:r>
+            <a:r>
+              <a:rPr lang="en-US" sz="3600" baseline="0" dirty="0" err="1" smtClean="0"/>
+              <a:t>osnove</a:t>
+            </a:r>
+            <a:endParaRPr lang="sr-Latn-RS" sz="3600" dirty="0"/>
           </a:p>
         </p:txBody>
       </p:sp>
@@ -7099,7 +7313,7 @@
           <a:p>
             <a:fld id="{B35B300D-7DF5-4E96-8AA6-60E94C6E9F44}" type="datetimeFigureOut">
               <a:rPr lang="sr-Latn-RS" smtClean="0"/>
-              <a:t>13.3.2018.</a:t>
+              <a:t>28.3.2018.</a:t>
             </a:fld>
             <a:endParaRPr lang="sr-Latn-RS"/>
           </a:p>
@@ -7521,29 +7735,29 @@
           <a:lstStyle/>
           <a:p>
             <a:r>
-              <a:rPr lang="en-US" b="1"/>
+              <a:rPr lang="en-US" b="1" dirty="0"/>
               <a:t>Front-End </a:t>
             </a:r>
             <a:r>
-              <a:rPr lang="en-US" b="1" smtClean="0"/>
+              <a:rPr lang="en-US" b="1" dirty="0" smtClean="0"/>
               <a:t>Developer</a:t>
             </a:r>
             <a:br>
-              <a:rPr lang="en-US" b="1" smtClean="0"/>
+              <a:rPr lang="en-US" b="1" dirty="0" smtClean="0"/>
             </a:br>
             <a:r>
-              <a:rPr lang="en-US" b="1" smtClean="0"/>
+              <a:rPr lang="en-US" b="1" dirty="0" smtClean="0"/>
               <a:t>21 </a:t>
             </a:r>
             <a:r>
-              <a:rPr lang="en-US" b="1" smtClean="0"/>
+              <a:rPr lang="en-US" b="1" dirty="0" smtClean="0"/>
               <a:t>– </a:t>
             </a:r>
             <a:r>
-              <a:rPr lang="en-US" b="1" smtClean="0"/>
+              <a:rPr lang="en-US" b="1" dirty="0" smtClean="0"/>
               <a:t>28.03.2018</a:t>
             </a:r>
-            <a:endParaRPr lang="en-US"/>
+            <a:endParaRPr lang="en-US" dirty="0"/>
           </a:p>
         </p:txBody>
       </p:sp>
@@ -7563,10 +7777,14 @@
           <a:lstStyle/>
           <a:p>
             <a:r>
-              <a:rPr lang="en-US" smtClean="0"/>
-              <a:t>Radovan Ostojić</a:t>
-            </a:r>
-            <a:endParaRPr lang="en-US"/>
+              <a:rPr lang="en-US" dirty="0" err="1" smtClean="0"/>
+              <a:t>Sinisa</a:t>
+            </a:r>
+            <a:r>
+              <a:rPr lang="en-US" dirty="0" smtClean="0"/>
+              <a:t> Vrhovac</a:t>
+            </a:r>
+            <a:endParaRPr lang="en-US" dirty="0"/>
           </a:p>
         </p:txBody>
       </p:sp>
@@ -7590,6 +7808,1225 @@
 </p:sld>
 </file>
 
+<file path=ppt/slides/slide10.xml><?xml version="1.0" encoding="utf-8"?>
+<p:sld xmlns:a="http://schemas.openxmlformats.org/drawingml/2006/main" xmlns:r="http://schemas.openxmlformats.org/officeDocument/2006/relationships" xmlns:p="http://schemas.openxmlformats.org/presentationml/2006/main">
+  <p:cSld>
+    <p:spTree>
+      <p:nvGrpSpPr>
+        <p:cNvPr id="1" name=""/>
+        <p:cNvGrpSpPr/>
+        <p:nvPr/>
+      </p:nvGrpSpPr>
+      <p:grpSpPr>
+        <a:xfrm>
+          <a:off x="0" y="0"/>
+          <a:ext cx="0" cy="0"/>
+          <a:chOff x="0" y="0"/>
+          <a:chExt cx="0" cy="0"/>
+        </a:xfrm>
+      </p:grpSpPr>
+      <p:sp>
+        <p:nvSpPr>
+          <p:cNvPr id="5" name="Title 4"/>
+          <p:cNvSpPr>
+            <a:spLocks noGrp="1"/>
+          </p:cNvSpPr>
+          <p:nvPr>
+            <p:ph type="title"/>
+          </p:nvPr>
+        </p:nvSpPr>
+        <p:spPr/>
+        <p:txBody>
+          <a:bodyPr/>
+          <a:lstStyle/>
+          <a:p>
+            <a:r>
+              <a:rPr lang="sr-Latn-CS" dirty="0" smtClean="0"/>
+              <a:t>Flex</a:t>
+            </a:r>
+            <a:endParaRPr lang="en-US" dirty="0"/>
+          </a:p>
+        </p:txBody>
+      </p:sp>
+      <p:pic>
+        <p:nvPicPr>
+          <p:cNvPr id="1026" name="Picture 2" descr="flex_terms.png"/>
+          <p:cNvPicPr>
+            <a:picLocks noGrp="1" noChangeAspect="1" noChangeArrowheads="1"/>
+          </p:cNvPicPr>
+          <p:nvPr>
+            <p:ph sz="quarter" idx="10"/>
+          </p:nvPr>
+        </p:nvPicPr>
+        <p:blipFill>
+          <a:blip r:embed="rId2">
+            <a:extLst>
+              <a:ext uri="{28A0092B-C50C-407E-A947-70E740481C1C}">
+                <a14:useLocalDpi xmlns:a14="http://schemas.microsoft.com/office/drawing/2010/main" val="0"/>
+              </a:ext>
+            </a:extLst>
+          </a:blip>
+          <a:srcRect/>
+          <a:stretch>
+            <a:fillRect/>
+          </a:stretch>
+        </p:blipFill>
+        <p:spPr bwMode="auto">
+          <a:xfrm>
+            <a:off x="1850554" y="1754188"/>
+            <a:ext cx="6546205" cy="3871912"/>
+          </a:xfrm>
+          <a:prstGeom prst="rect">
+            <a:avLst/>
+          </a:prstGeom>
+          <a:noFill/>
+          <a:extLst>
+            <a:ext uri="{909E8E84-426E-40DD-AFC4-6F175D3DCCD1}">
+              <a14:hiddenFill xmlns:a14="http://schemas.microsoft.com/office/drawing/2010/main">
+                <a:solidFill>
+                  <a:srgbClr val="FFFFFF"/>
+                </a:solidFill>
+              </a14:hiddenFill>
+            </a:ext>
+          </a:extLst>
+        </p:spPr>
+      </p:pic>
+    </p:spTree>
+    <p:extLst>
+      <p:ext uri="{BB962C8B-B14F-4D97-AF65-F5344CB8AC3E}">
+        <p14:creationId xmlns:p14="http://schemas.microsoft.com/office/powerpoint/2010/main" val="4104534433"/>
+      </p:ext>
+    </p:extLst>
+  </p:cSld>
+  <p:clrMapOvr>
+    <a:masterClrMapping/>
+  </p:clrMapOvr>
+</p:sld>
+</file>
+
+<file path=ppt/slides/slide11.xml><?xml version="1.0" encoding="utf-8"?>
+<p:sld xmlns:a="http://schemas.openxmlformats.org/drawingml/2006/main" xmlns:r="http://schemas.openxmlformats.org/officeDocument/2006/relationships" xmlns:p="http://schemas.openxmlformats.org/presentationml/2006/main">
+  <p:cSld>
+    <p:spTree>
+      <p:nvGrpSpPr>
+        <p:cNvPr id="1" name=""/>
+        <p:cNvGrpSpPr/>
+        <p:nvPr/>
+      </p:nvGrpSpPr>
+      <p:grpSpPr>
+        <a:xfrm>
+          <a:off x="0" y="0"/>
+          <a:ext cx="0" cy="0"/>
+          <a:chOff x="0" y="0"/>
+          <a:chExt cx="0" cy="0"/>
+        </a:xfrm>
+      </p:grpSpPr>
+      <p:sp>
+        <p:nvSpPr>
+          <p:cNvPr id="5" name="Title 4"/>
+          <p:cNvSpPr>
+            <a:spLocks noGrp="1"/>
+          </p:cNvSpPr>
+          <p:nvPr>
+            <p:ph type="title"/>
+          </p:nvPr>
+        </p:nvSpPr>
+        <p:spPr/>
+        <p:txBody>
+          <a:bodyPr/>
+          <a:lstStyle/>
+          <a:p>
+            <a:r>
+              <a:rPr lang="sr-Latn-CS" dirty="0" smtClean="0"/>
+              <a:t>Grid</a:t>
+            </a:r>
+            <a:endParaRPr lang="en-US" dirty="0"/>
+          </a:p>
+        </p:txBody>
+      </p:sp>
+      <p:pic>
+        <p:nvPicPr>
+          <p:cNvPr id="9218" name="Picture 2" descr="https://mdn.mozillademos.org/files/13899/grid.png"/>
+          <p:cNvPicPr>
+            <a:picLocks noGrp="1" noChangeAspect="1" noChangeArrowheads="1"/>
+          </p:cNvPicPr>
+          <p:nvPr>
+            <p:ph sz="quarter" idx="10"/>
+          </p:nvPr>
+        </p:nvPicPr>
+        <p:blipFill>
+          <a:blip r:embed="rId2">
+            <a:extLst>
+              <a:ext uri="{28A0092B-C50C-407E-A947-70E740481C1C}">
+                <a14:useLocalDpi xmlns:a14="http://schemas.microsoft.com/office/drawing/2010/main" val="0"/>
+              </a:ext>
+            </a:extLst>
+          </a:blip>
+          <a:srcRect/>
+          <a:stretch>
+            <a:fillRect/>
+          </a:stretch>
+        </p:blipFill>
+        <p:spPr bwMode="auto">
+          <a:xfrm>
+            <a:off x="936670" y="1754188"/>
+            <a:ext cx="8373972" cy="3871912"/>
+          </a:xfrm>
+          <a:prstGeom prst="rect">
+            <a:avLst/>
+          </a:prstGeom>
+          <a:noFill/>
+          <a:extLst>
+            <a:ext uri="{909E8E84-426E-40DD-AFC4-6F175D3DCCD1}">
+              <a14:hiddenFill xmlns:a14="http://schemas.microsoft.com/office/drawing/2010/main">
+                <a:solidFill>
+                  <a:srgbClr val="FFFFFF"/>
+                </a:solidFill>
+              </a14:hiddenFill>
+            </a:ext>
+          </a:extLst>
+        </p:spPr>
+      </p:pic>
+    </p:spTree>
+    <p:extLst>
+      <p:ext uri="{BB962C8B-B14F-4D97-AF65-F5344CB8AC3E}">
+        <p14:creationId xmlns:p14="http://schemas.microsoft.com/office/powerpoint/2010/main" val="4204055485"/>
+      </p:ext>
+    </p:extLst>
+  </p:cSld>
+  <p:clrMapOvr>
+    <a:masterClrMapping/>
+  </p:clrMapOvr>
+</p:sld>
+</file>
+
+<file path=ppt/slides/slide12.xml><?xml version="1.0" encoding="utf-8"?>
+<p:sld xmlns:a="http://schemas.openxmlformats.org/drawingml/2006/main" xmlns:r="http://schemas.openxmlformats.org/officeDocument/2006/relationships" xmlns:p="http://schemas.openxmlformats.org/presentationml/2006/main">
+  <p:cSld>
+    <p:spTree>
+      <p:nvGrpSpPr>
+        <p:cNvPr id="1" name=""/>
+        <p:cNvGrpSpPr/>
+        <p:nvPr/>
+      </p:nvGrpSpPr>
+      <p:grpSpPr>
+        <a:xfrm>
+          <a:off x="0" y="0"/>
+          <a:ext cx="0" cy="0"/>
+          <a:chOff x="0" y="0"/>
+          <a:chExt cx="0" cy="0"/>
+        </a:xfrm>
+      </p:grpSpPr>
+      <p:sp>
+        <p:nvSpPr>
+          <p:cNvPr id="5" name="Title 4"/>
+          <p:cNvSpPr>
+            <a:spLocks noGrp="1"/>
+          </p:cNvSpPr>
+          <p:nvPr>
+            <p:ph type="title"/>
+          </p:nvPr>
+        </p:nvSpPr>
+        <p:spPr/>
+        <p:txBody>
+          <a:bodyPr/>
+          <a:lstStyle/>
+          <a:p>
+            <a:r>
+              <a:rPr lang="sr-Latn-CS" dirty="0" smtClean="0"/>
+              <a:t>Grid</a:t>
+            </a:r>
+            <a:endParaRPr lang="en-US" dirty="0"/>
+          </a:p>
+        </p:txBody>
+      </p:sp>
+      <p:pic>
+        <p:nvPicPr>
+          <p:cNvPr id="8" name="Content Placeholder 7" descr="c# - Creating Custom &lt;strong&gt;Layout&lt;/strong&gt; in ASP.Net MVC3 using Razor ..."/>
+          <p:cNvPicPr>
+            <a:picLocks noGrp="1" noChangeAspect="1"/>
+          </p:cNvPicPr>
+          <p:nvPr>
+            <p:ph sz="quarter" idx="10"/>
+          </p:nvPr>
+        </p:nvPicPr>
+        <p:blipFill>
+          <a:blip r:embed="rId2">
+            <a:extLst>
+              <a:ext uri="{28A0092B-C50C-407E-A947-70E740481C1C}">
+                <a14:useLocalDpi xmlns:a14="http://schemas.microsoft.com/office/drawing/2010/main" val="0"/>
+              </a:ext>
+            </a:extLst>
+          </a:blip>
+          <a:stretch>
+            <a:fillRect/>
+          </a:stretch>
+        </p:blipFill>
+        <p:spPr>
+          <a:xfrm>
+            <a:off x="1962304" y="1754188"/>
+            <a:ext cx="6322704" cy="3871912"/>
+          </a:xfrm>
+          <a:prstGeom prst="rect">
+            <a:avLst/>
+          </a:prstGeom>
+        </p:spPr>
+      </p:pic>
+    </p:spTree>
+    <p:extLst>
+      <p:ext uri="{BB962C8B-B14F-4D97-AF65-F5344CB8AC3E}">
+        <p14:creationId xmlns:p14="http://schemas.microsoft.com/office/powerpoint/2010/main" val="2834116639"/>
+      </p:ext>
+    </p:extLst>
+  </p:cSld>
+  <p:clrMapOvr>
+    <a:masterClrMapping/>
+  </p:clrMapOvr>
+</p:sld>
+</file>
+
+<file path=ppt/slides/slide13.xml><?xml version="1.0" encoding="utf-8"?>
+<p:sld xmlns:a="http://schemas.openxmlformats.org/drawingml/2006/main" xmlns:r="http://schemas.openxmlformats.org/officeDocument/2006/relationships" xmlns:p="http://schemas.openxmlformats.org/presentationml/2006/main">
+  <p:cSld>
+    <p:spTree>
+      <p:nvGrpSpPr>
+        <p:cNvPr id="1" name=""/>
+        <p:cNvGrpSpPr/>
+        <p:nvPr/>
+      </p:nvGrpSpPr>
+      <p:grpSpPr>
+        <a:xfrm>
+          <a:off x="0" y="0"/>
+          <a:ext cx="0" cy="0"/>
+          <a:chOff x="0" y="0"/>
+          <a:chExt cx="0" cy="0"/>
+        </a:xfrm>
+      </p:grpSpPr>
+      <p:sp>
+        <p:nvSpPr>
+          <p:cNvPr id="5" name="Title 4"/>
+          <p:cNvSpPr>
+            <a:spLocks noGrp="1"/>
+          </p:cNvSpPr>
+          <p:nvPr>
+            <p:ph type="title"/>
+          </p:nvPr>
+        </p:nvSpPr>
+        <p:spPr/>
+        <p:txBody>
+          <a:bodyPr/>
+          <a:lstStyle/>
+          <a:p>
+            <a:r>
+              <a:rPr lang="sr-Latn-CS" dirty="0" smtClean="0"/>
+              <a:t>Float</a:t>
+            </a:r>
+            <a:endParaRPr lang="en-US" dirty="0"/>
+          </a:p>
+        </p:txBody>
+      </p:sp>
+      <p:sp>
+        <p:nvSpPr>
+          <p:cNvPr id="2" name="Content Placeholder 1"/>
+          <p:cNvSpPr>
+            <a:spLocks noGrp="1"/>
+          </p:cNvSpPr>
+          <p:nvPr>
+            <p:ph sz="quarter" idx="10"/>
+          </p:nvPr>
+        </p:nvSpPr>
+        <p:spPr/>
+        <p:txBody>
+          <a:bodyPr/>
+          <a:lstStyle/>
+          <a:p>
+            <a:endParaRPr lang="en-US"/>
+          </a:p>
+        </p:txBody>
+      </p:sp>
+    </p:spTree>
+    <p:extLst>
+      <p:ext uri="{BB962C8B-B14F-4D97-AF65-F5344CB8AC3E}">
+        <p14:creationId xmlns:p14="http://schemas.microsoft.com/office/powerpoint/2010/main" val="3826998218"/>
+      </p:ext>
+    </p:extLst>
+  </p:cSld>
+  <p:clrMapOvr>
+    <a:masterClrMapping/>
+  </p:clrMapOvr>
+</p:sld>
+</file>
+
+<file path=ppt/slides/slide14.xml><?xml version="1.0" encoding="utf-8"?>
+<p:sld xmlns:a="http://schemas.openxmlformats.org/drawingml/2006/main" xmlns:r="http://schemas.openxmlformats.org/officeDocument/2006/relationships" xmlns:p="http://schemas.openxmlformats.org/presentationml/2006/main">
+  <p:cSld>
+    <p:spTree>
+      <p:nvGrpSpPr>
+        <p:cNvPr id="1" name=""/>
+        <p:cNvGrpSpPr/>
+        <p:nvPr/>
+      </p:nvGrpSpPr>
+      <p:grpSpPr>
+        <a:xfrm>
+          <a:off x="0" y="0"/>
+          <a:ext cx="0" cy="0"/>
+          <a:chOff x="0" y="0"/>
+          <a:chExt cx="0" cy="0"/>
+        </a:xfrm>
+      </p:grpSpPr>
+      <p:sp>
+        <p:nvSpPr>
+          <p:cNvPr id="5" name="Title 4"/>
+          <p:cNvSpPr>
+            <a:spLocks noGrp="1"/>
+          </p:cNvSpPr>
+          <p:nvPr>
+            <p:ph type="title"/>
+          </p:nvPr>
+        </p:nvSpPr>
+        <p:spPr/>
+        <p:txBody>
+          <a:bodyPr/>
+          <a:lstStyle/>
+          <a:p>
+            <a:r>
+              <a:rPr lang="sr-Latn-CS" dirty="0" smtClean="0"/>
+              <a:t>Position</a:t>
+            </a:r>
+            <a:endParaRPr lang="en-US" dirty="0"/>
+          </a:p>
+        </p:txBody>
+      </p:sp>
+      <p:sp>
+        <p:nvSpPr>
+          <p:cNvPr id="2" name="Content Placeholder 1"/>
+          <p:cNvSpPr>
+            <a:spLocks noGrp="1"/>
+          </p:cNvSpPr>
+          <p:nvPr>
+            <p:ph sz="quarter" idx="10"/>
+          </p:nvPr>
+        </p:nvSpPr>
+        <p:spPr/>
+        <p:txBody>
+          <a:bodyPr/>
+          <a:lstStyle/>
+          <a:p>
+            <a:endParaRPr lang="en-US"/>
+          </a:p>
+        </p:txBody>
+      </p:sp>
+    </p:spTree>
+    <p:extLst>
+      <p:ext uri="{BB962C8B-B14F-4D97-AF65-F5344CB8AC3E}">
+        <p14:creationId xmlns:p14="http://schemas.microsoft.com/office/powerpoint/2010/main" val="2147668348"/>
+      </p:ext>
+    </p:extLst>
+  </p:cSld>
+  <p:clrMapOvr>
+    <a:masterClrMapping/>
+  </p:clrMapOvr>
+</p:sld>
+</file>
+
+<file path=ppt/slides/slide15.xml><?xml version="1.0" encoding="utf-8"?>
+<p:sld xmlns:a="http://schemas.openxmlformats.org/drawingml/2006/main" xmlns:r="http://schemas.openxmlformats.org/officeDocument/2006/relationships" xmlns:p="http://schemas.openxmlformats.org/presentationml/2006/main">
+  <p:cSld>
+    <p:spTree>
+      <p:nvGrpSpPr>
+        <p:cNvPr id="1" name=""/>
+        <p:cNvGrpSpPr/>
+        <p:nvPr/>
+      </p:nvGrpSpPr>
+      <p:grpSpPr>
+        <a:xfrm>
+          <a:off x="0" y="0"/>
+          <a:ext cx="0" cy="0"/>
+          <a:chOff x="0" y="0"/>
+          <a:chExt cx="0" cy="0"/>
+        </a:xfrm>
+      </p:grpSpPr>
+      <p:sp>
+        <p:nvSpPr>
+          <p:cNvPr id="5" name="Title 4"/>
+          <p:cNvSpPr>
+            <a:spLocks noGrp="1"/>
+          </p:cNvSpPr>
+          <p:nvPr>
+            <p:ph type="title"/>
+          </p:nvPr>
+        </p:nvSpPr>
+        <p:spPr/>
+        <p:txBody>
+          <a:bodyPr/>
+          <a:lstStyle/>
+          <a:p>
+            <a:r>
+              <a:rPr lang="en-US" dirty="0" err="1" smtClean="0"/>
+              <a:t>Pozicija</a:t>
+            </a:r>
+            <a:r>
+              <a:rPr lang="en-US" dirty="0" smtClean="0"/>
+              <a:t> </a:t>
+            </a:r>
+            <a:r>
+              <a:rPr lang="en-US" dirty="0" err="1" smtClean="0"/>
+              <a:t>i</a:t>
+            </a:r>
+            <a:r>
+              <a:rPr lang="en-US" dirty="0" smtClean="0"/>
+              <a:t> </a:t>
+            </a:r>
+            <a:r>
+              <a:rPr lang="en-US" dirty="0" err="1" smtClean="0"/>
+              <a:t>slaganje</a:t>
+            </a:r>
+            <a:endParaRPr lang="en-US" dirty="0"/>
+          </a:p>
+        </p:txBody>
+      </p:sp>
+      <p:pic>
+        <p:nvPicPr>
+          <p:cNvPr id="8" name="Content Placeholder 7" descr="c# - Creating Custom &lt;strong&gt;Layout&lt;/strong&gt; in ASP.Net MVC3 using Razor ..."/>
+          <p:cNvPicPr>
+            <a:picLocks noGrp="1" noChangeAspect="1"/>
+          </p:cNvPicPr>
+          <p:nvPr>
+            <p:ph sz="quarter" idx="10"/>
+          </p:nvPr>
+        </p:nvPicPr>
+        <p:blipFill>
+          <a:blip r:embed="rId2">
+            <a:extLst>
+              <a:ext uri="{28A0092B-C50C-407E-A947-70E740481C1C}">
+                <a14:useLocalDpi xmlns:a14="http://schemas.microsoft.com/office/drawing/2010/main" val="0"/>
+              </a:ext>
+            </a:extLst>
+          </a:blip>
+          <a:stretch>
+            <a:fillRect/>
+          </a:stretch>
+        </p:blipFill>
+        <p:spPr>
+          <a:xfrm>
+            <a:off x="1962304" y="1754188"/>
+            <a:ext cx="6322704" cy="3871912"/>
+          </a:xfrm>
+          <a:prstGeom prst="rect">
+            <a:avLst/>
+          </a:prstGeom>
+        </p:spPr>
+      </p:pic>
+    </p:spTree>
+    <p:extLst>
+      <p:ext uri="{BB962C8B-B14F-4D97-AF65-F5344CB8AC3E}">
+        <p14:creationId xmlns:p14="http://schemas.microsoft.com/office/powerpoint/2010/main" val="3467444851"/>
+      </p:ext>
+    </p:extLst>
+  </p:cSld>
+  <p:clrMapOvr>
+    <a:masterClrMapping/>
+  </p:clrMapOvr>
+</p:sld>
+</file>
+
+<file path=ppt/slides/slide16.xml><?xml version="1.0" encoding="utf-8"?>
+<p:sld xmlns:a="http://schemas.openxmlformats.org/drawingml/2006/main" xmlns:r="http://schemas.openxmlformats.org/officeDocument/2006/relationships" xmlns:p="http://schemas.openxmlformats.org/presentationml/2006/main">
+  <p:cSld>
+    <p:spTree>
+      <p:nvGrpSpPr>
+        <p:cNvPr id="1" name=""/>
+        <p:cNvGrpSpPr/>
+        <p:nvPr/>
+      </p:nvGrpSpPr>
+      <p:grpSpPr>
+        <a:xfrm>
+          <a:off x="0" y="0"/>
+          <a:ext cx="0" cy="0"/>
+          <a:chOff x="0" y="0"/>
+          <a:chExt cx="0" cy="0"/>
+        </a:xfrm>
+      </p:grpSpPr>
+      <p:sp>
+        <p:nvSpPr>
+          <p:cNvPr id="4" name="Title 3"/>
+          <p:cNvSpPr>
+            <a:spLocks noGrp="1"/>
+          </p:cNvSpPr>
+          <p:nvPr>
+            <p:ph type="title"/>
+          </p:nvPr>
+        </p:nvSpPr>
+        <p:spPr/>
+        <p:txBody>
+          <a:bodyPr/>
+          <a:lstStyle/>
+          <a:p>
+            <a:r>
+              <a:rPr lang="en-US" dirty="0"/>
+              <a:t>„Responsive“ </a:t>
+            </a:r>
+            <a:r>
+              <a:rPr lang="en-US" dirty="0" err="1"/>
+              <a:t>dizajn</a:t>
+            </a:r>
+            <a:endParaRPr lang="en-US" dirty="0"/>
+          </a:p>
+        </p:txBody>
+      </p:sp>
+    </p:spTree>
+    <p:extLst>
+      <p:ext uri="{BB962C8B-B14F-4D97-AF65-F5344CB8AC3E}">
+        <p14:creationId xmlns:p14="http://schemas.microsoft.com/office/powerpoint/2010/main" val="466228987"/>
+      </p:ext>
+    </p:extLst>
+  </p:cSld>
+  <p:clrMapOvr>
+    <a:masterClrMapping/>
+  </p:clrMapOvr>
+</p:sld>
+</file>
+
+<file path=ppt/slides/slide17.xml><?xml version="1.0" encoding="utf-8"?>
+<p:sld xmlns:a="http://schemas.openxmlformats.org/drawingml/2006/main" xmlns:r="http://schemas.openxmlformats.org/officeDocument/2006/relationships" xmlns:p="http://schemas.openxmlformats.org/presentationml/2006/main">
+  <p:cSld>
+    <p:spTree>
+      <p:nvGrpSpPr>
+        <p:cNvPr id="1" name=""/>
+        <p:cNvGrpSpPr/>
+        <p:nvPr/>
+      </p:nvGrpSpPr>
+      <p:grpSpPr>
+        <a:xfrm>
+          <a:off x="0" y="0"/>
+          <a:ext cx="0" cy="0"/>
+          <a:chOff x="0" y="0"/>
+          <a:chExt cx="0" cy="0"/>
+        </a:xfrm>
+      </p:grpSpPr>
+      <p:sp>
+        <p:nvSpPr>
+          <p:cNvPr id="3" name="Title 2"/>
+          <p:cNvSpPr>
+            <a:spLocks noGrp="1"/>
+          </p:cNvSpPr>
+          <p:nvPr>
+            <p:ph type="title"/>
+          </p:nvPr>
+        </p:nvSpPr>
+        <p:spPr/>
+        <p:txBody>
+          <a:bodyPr/>
+          <a:lstStyle/>
+          <a:p>
+            <a:r>
+              <a:rPr lang="en-US" dirty="0"/>
+              <a:t>„Responsive“ </a:t>
+            </a:r>
+            <a:r>
+              <a:rPr lang="en-US" dirty="0" err="1"/>
+              <a:t>dizajn</a:t>
+            </a:r>
+            <a:endParaRPr lang="en-US" dirty="0"/>
+          </a:p>
+        </p:txBody>
+      </p:sp>
+      <p:sp>
+        <p:nvSpPr>
+          <p:cNvPr id="2" name="Content Placeholder 1"/>
+          <p:cNvSpPr>
+            <a:spLocks noGrp="1"/>
+          </p:cNvSpPr>
+          <p:nvPr>
+            <p:ph sz="quarter" idx="10"/>
+          </p:nvPr>
+        </p:nvSpPr>
+        <p:spPr/>
+        <p:txBody>
+          <a:bodyPr/>
+          <a:lstStyle/>
+          <a:p>
+            <a:endParaRPr lang="en-US"/>
+          </a:p>
+        </p:txBody>
+      </p:sp>
+      <p:pic>
+        <p:nvPicPr>
+          <p:cNvPr id="3078" name="Picture 6" descr="https://www.w3schools.com/css/img_rwd_phone.jpg"/>
+          <p:cNvPicPr>
+            <a:picLocks noChangeAspect="1" noChangeArrowheads="1"/>
+          </p:cNvPicPr>
+          <p:nvPr/>
+        </p:nvPicPr>
+        <p:blipFill>
+          <a:blip r:embed="rId2">
+            <a:extLst>
+              <a:ext uri="{28A0092B-C50C-407E-A947-70E740481C1C}">
+                <a14:useLocalDpi xmlns:a14="http://schemas.microsoft.com/office/drawing/2010/main" val="0"/>
+              </a:ext>
+            </a:extLst>
+          </a:blip>
+          <a:srcRect/>
+          <a:stretch>
+            <a:fillRect/>
+          </a:stretch>
+        </p:blipFill>
+        <p:spPr bwMode="auto">
+          <a:xfrm>
+            <a:off x="2505075" y="3898900"/>
+            <a:ext cx="704850" cy="1362075"/>
+          </a:xfrm>
+          <a:prstGeom prst="rect">
+            <a:avLst/>
+          </a:prstGeom>
+          <a:noFill/>
+          <a:ln>
+            <a:solidFill>
+              <a:srgbClr val="FFC000"/>
+            </a:solidFill>
+          </a:ln>
+          <a:extLst>
+            <a:ext uri="{909E8E84-426E-40DD-AFC4-6F175D3DCCD1}">
+              <a14:hiddenFill xmlns:a14="http://schemas.microsoft.com/office/drawing/2010/main">
+                <a:solidFill>
+                  <a:srgbClr val="FFFFFF"/>
+                </a:solidFill>
+              </a14:hiddenFill>
+            </a:ext>
+          </a:extLst>
+        </p:spPr>
+      </p:pic>
+      <p:pic>
+        <p:nvPicPr>
+          <p:cNvPr id="3080" name="Picture 8" descr="https://www.w3schools.com/css/img_rwd_tablet.jpg"/>
+          <p:cNvPicPr>
+            <a:picLocks noChangeAspect="1" noChangeArrowheads="1"/>
+          </p:cNvPicPr>
+          <p:nvPr/>
+        </p:nvPicPr>
+        <p:blipFill>
+          <a:blip r:embed="rId3">
+            <a:extLst>
+              <a:ext uri="{28A0092B-C50C-407E-A947-70E740481C1C}">
+                <a14:useLocalDpi xmlns:a14="http://schemas.microsoft.com/office/drawing/2010/main" val="0"/>
+              </a:ext>
+            </a:extLst>
+          </a:blip>
+          <a:srcRect/>
+          <a:stretch>
+            <a:fillRect/>
+          </a:stretch>
+        </p:blipFill>
+        <p:spPr bwMode="auto">
+          <a:xfrm>
+            <a:off x="3482975" y="2974974"/>
+            <a:ext cx="1600200" cy="2286001"/>
+          </a:xfrm>
+          <a:prstGeom prst="rect">
+            <a:avLst/>
+          </a:prstGeom>
+          <a:noFill/>
+          <a:ln>
+            <a:solidFill>
+              <a:srgbClr val="FFC000"/>
+            </a:solidFill>
+          </a:ln>
+          <a:extLst>
+            <a:ext uri="{909E8E84-426E-40DD-AFC4-6F175D3DCCD1}">
+              <a14:hiddenFill xmlns:a14="http://schemas.microsoft.com/office/drawing/2010/main">
+                <a:solidFill>
+                  <a:srgbClr val="FFFFFF"/>
+                </a:solidFill>
+              </a14:hiddenFill>
+            </a:ext>
+          </a:extLst>
+        </p:spPr>
+      </p:pic>
+      <p:pic>
+        <p:nvPicPr>
+          <p:cNvPr id="3082" name="Picture 10" descr="https://www.w3schools.com/css/img_rwd_desktop.jpg"/>
+          <p:cNvPicPr>
+            <a:picLocks noChangeAspect="1" noChangeArrowheads="1"/>
+          </p:cNvPicPr>
+          <p:nvPr/>
+        </p:nvPicPr>
+        <p:blipFill>
+          <a:blip r:embed="rId4">
+            <a:extLst>
+              <a:ext uri="{28A0092B-C50C-407E-A947-70E740481C1C}">
+                <a14:useLocalDpi xmlns:a14="http://schemas.microsoft.com/office/drawing/2010/main" val="0"/>
+              </a:ext>
+            </a:extLst>
+          </a:blip>
+          <a:srcRect/>
+          <a:stretch>
+            <a:fillRect/>
+          </a:stretch>
+        </p:blipFill>
+        <p:spPr bwMode="auto">
+          <a:xfrm>
+            <a:off x="5356225" y="2308224"/>
+            <a:ext cx="4095750" cy="2952751"/>
+          </a:xfrm>
+          <a:prstGeom prst="rect">
+            <a:avLst/>
+          </a:prstGeom>
+          <a:noFill/>
+          <a:ln>
+            <a:solidFill>
+              <a:srgbClr val="FFC000"/>
+            </a:solidFill>
+          </a:ln>
+          <a:extLst>
+            <a:ext uri="{909E8E84-426E-40DD-AFC4-6F175D3DCCD1}">
+              <a14:hiddenFill xmlns:a14="http://schemas.microsoft.com/office/drawing/2010/main">
+                <a:solidFill>
+                  <a:srgbClr val="FFFFFF"/>
+                </a:solidFill>
+              </a14:hiddenFill>
+            </a:ext>
+          </a:extLst>
+        </p:spPr>
+      </p:pic>
+    </p:spTree>
+    <p:extLst>
+      <p:ext uri="{BB962C8B-B14F-4D97-AF65-F5344CB8AC3E}">
+        <p14:creationId xmlns:p14="http://schemas.microsoft.com/office/powerpoint/2010/main" val="1949403407"/>
+      </p:ext>
+    </p:extLst>
+  </p:cSld>
+  <p:clrMapOvr>
+    <a:masterClrMapping/>
+  </p:clrMapOvr>
+</p:sld>
+</file>
+
+<file path=ppt/slides/slide18.xml><?xml version="1.0" encoding="utf-8"?>
+<p:sld xmlns:a="http://schemas.openxmlformats.org/drawingml/2006/main" xmlns:r="http://schemas.openxmlformats.org/officeDocument/2006/relationships" xmlns:p="http://schemas.openxmlformats.org/presentationml/2006/main">
+  <p:cSld>
+    <p:spTree>
+      <p:nvGrpSpPr>
+        <p:cNvPr id="1" name=""/>
+        <p:cNvGrpSpPr/>
+        <p:nvPr/>
+      </p:nvGrpSpPr>
+      <p:grpSpPr>
+        <a:xfrm>
+          <a:off x="0" y="0"/>
+          <a:ext cx="0" cy="0"/>
+          <a:chOff x="0" y="0"/>
+          <a:chExt cx="0" cy="0"/>
+        </a:xfrm>
+      </p:grpSpPr>
+      <p:sp>
+        <p:nvSpPr>
+          <p:cNvPr id="3" name="Title 2"/>
+          <p:cNvSpPr>
+            <a:spLocks noGrp="1"/>
+          </p:cNvSpPr>
+          <p:nvPr>
+            <p:ph type="title"/>
+          </p:nvPr>
+        </p:nvSpPr>
+        <p:spPr/>
+        <p:txBody>
+          <a:bodyPr/>
+          <a:lstStyle/>
+          <a:p>
+            <a:r>
+              <a:rPr lang="sr-Latn-CS" dirty="0" smtClean="0"/>
+              <a:t>„</a:t>
+            </a:r>
+            <a:r>
+              <a:rPr lang="en-US" dirty="0" smtClean="0"/>
+              <a:t>Responsive</a:t>
+            </a:r>
+            <a:r>
+              <a:rPr lang="sr-Latn-CS" dirty="0" smtClean="0"/>
+              <a:t>“</a:t>
+            </a:r>
+            <a:r>
+              <a:rPr lang="en-US" dirty="0" smtClean="0"/>
+              <a:t> d</a:t>
+            </a:r>
+            <a:r>
+              <a:rPr lang="sr-Latn-CS" dirty="0" smtClean="0"/>
+              <a:t>izajn</a:t>
+            </a:r>
+            <a:endParaRPr lang="en-US" dirty="0"/>
+          </a:p>
+        </p:txBody>
+      </p:sp>
+      <p:sp>
+        <p:nvSpPr>
+          <p:cNvPr id="4" name="Content Placeholder 3"/>
+          <p:cNvSpPr>
+            <a:spLocks noGrp="1"/>
+          </p:cNvSpPr>
+          <p:nvPr>
+            <p:ph sz="quarter" idx="10"/>
+          </p:nvPr>
+        </p:nvSpPr>
+        <p:spPr/>
+        <p:txBody>
+          <a:bodyPr/>
+          <a:lstStyle/>
+          <a:p>
+            <a:r>
+              <a:rPr lang="en-US" sz="1600" dirty="0">
+                <a:latin typeface="Courier New" panose="02070309020205020404" pitchFamily="49" charset="0"/>
+                <a:cs typeface="Courier New" panose="02070309020205020404" pitchFamily="49" charset="0"/>
+              </a:rPr>
+              <a:t>&lt;meta name="viewport" content="width=device-width, </a:t>
+            </a:r>
+            <a:r>
+              <a:rPr lang="en-US" sz="1600" dirty="0" smtClean="0">
+                <a:latin typeface="Courier New" panose="02070309020205020404" pitchFamily="49" charset="0"/>
+                <a:cs typeface="Courier New" panose="02070309020205020404" pitchFamily="49" charset="0"/>
+              </a:rPr>
+              <a:t>initial-scale=1.0"&gt;</a:t>
+            </a:r>
+            <a:endParaRPr lang="sr-Latn-CS" sz="1600" dirty="0" smtClean="0">
+              <a:latin typeface="Courier New" panose="02070309020205020404" pitchFamily="49" charset="0"/>
+              <a:cs typeface="Courier New" panose="02070309020205020404" pitchFamily="49" charset="0"/>
+            </a:endParaRPr>
+          </a:p>
+          <a:p>
+            <a:r>
+              <a:rPr lang="en-US" sz="1600" dirty="0">
+                <a:latin typeface="Courier New" panose="02070309020205020404" pitchFamily="49" charset="0"/>
+                <a:cs typeface="Courier New" panose="02070309020205020404" pitchFamily="49" charset="0"/>
+              </a:rPr>
+              <a:t>&lt;h1 style="font-size:10vw"&gt;Hello World&lt;/h1&gt;</a:t>
+            </a:r>
+            <a:endParaRPr lang="sr-Latn-CS" sz="1600" dirty="0" smtClean="0">
+              <a:latin typeface="Courier New" panose="02070309020205020404" pitchFamily="49" charset="0"/>
+              <a:cs typeface="Courier New" panose="02070309020205020404" pitchFamily="49" charset="0"/>
+            </a:endParaRPr>
+          </a:p>
+          <a:p>
+            <a:r>
+              <a:rPr lang="en-US" sz="1600" dirty="0">
+                <a:latin typeface="Courier New" panose="02070309020205020404" pitchFamily="49" charset="0"/>
+                <a:cs typeface="Courier New" panose="02070309020205020404" pitchFamily="49" charset="0"/>
+              </a:rPr>
+              <a:t>&lt;</a:t>
+            </a:r>
+            <a:r>
+              <a:rPr lang="en-US" sz="1600" dirty="0" err="1">
+                <a:latin typeface="Courier New" panose="02070309020205020404" pitchFamily="49" charset="0"/>
+                <a:cs typeface="Courier New" panose="02070309020205020404" pitchFamily="49" charset="0"/>
+              </a:rPr>
+              <a:t>img</a:t>
+            </a:r>
+            <a:r>
+              <a:rPr lang="en-US" sz="1600" dirty="0">
+                <a:latin typeface="Courier New" panose="02070309020205020404" pitchFamily="49" charset="0"/>
+                <a:cs typeface="Courier New" panose="02070309020205020404" pitchFamily="49" charset="0"/>
+              </a:rPr>
+              <a:t> </a:t>
+            </a:r>
+            <a:r>
+              <a:rPr lang="en-US" sz="1600" dirty="0" err="1">
+                <a:latin typeface="Courier New" panose="02070309020205020404" pitchFamily="49" charset="0"/>
+                <a:cs typeface="Courier New" panose="02070309020205020404" pitchFamily="49" charset="0"/>
+              </a:rPr>
+              <a:t>src</a:t>
+            </a:r>
+            <a:r>
+              <a:rPr lang="en-US" sz="1600" dirty="0">
+                <a:latin typeface="Courier New" panose="02070309020205020404" pitchFamily="49" charset="0"/>
+                <a:cs typeface="Courier New" panose="02070309020205020404" pitchFamily="49" charset="0"/>
+              </a:rPr>
+              <a:t>="img_girl.jpg" style="width:100</a:t>
+            </a:r>
+            <a:r>
+              <a:rPr lang="en-US" sz="1600" dirty="0" smtClean="0">
+                <a:latin typeface="Courier New" panose="02070309020205020404" pitchFamily="49" charset="0"/>
+                <a:cs typeface="Courier New" panose="02070309020205020404" pitchFamily="49" charset="0"/>
+              </a:rPr>
+              <a:t>%;"&gt;</a:t>
+            </a:r>
+            <a:endParaRPr lang="sr-Latn-CS" sz="1600" dirty="0" smtClean="0">
+              <a:latin typeface="Courier New" panose="02070309020205020404" pitchFamily="49" charset="0"/>
+              <a:cs typeface="Courier New" panose="02070309020205020404" pitchFamily="49" charset="0"/>
+            </a:endParaRPr>
+          </a:p>
+          <a:p>
+            <a:r>
+              <a:rPr lang="en-US" sz="1600" dirty="0">
+                <a:latin typeface="Courier New" panose="02070309020205020404" pitchFamily="49" charset="0"/>
+                <a:cs typeface="Courier New" panose="02070309020205020404" pitchFamily="49" charset="0"/>
+              </a:rPr>
+              <a:t>&lt;</a:t>
+            </a:r>
+            <a:r>
+              <a:rPr lang="en-US" sz="1600" dirty="0" err="1">
+                <a:latin typeface="Courier New" panose="02070309020205020404" pitchFamily="49" charset="0"/>
+                <a:cs typeface="Courier New" panose="02070309020205020404" pitchFamily="49" charset="0"/>
+              </a:rPr>
+              <a:t>img</a:t>
+            </a:r>
+            <a:r>
+              <a:rPr lang="en-US" sz="1600" dirty="0">
+                <a:latin typeface="Courier New" panose="02070309020205020404" pitchFamily="49" charset="0"/>
+                <a:cs typeface="Courier New" panose="02070309020205020404" pitchFamily="49" charset="0"/>
+              </a:rPr>
+              <a:t> </a:t>
+            </a:r>
+            <a:r>
+              <a:rPr lang="en-US" sz="1600" dirty="0" err="1">
+                <a:latin typeface="Courier New" panose="02070309020205020404" pitchFamily="49" charset="0"/>
+                <a:cs typeface="Courier New" panose="02070309020205020404" pitchFamily="49" charset="0"/>
+              </a:rPr>
+              <a:t>src</a:t>
+            </a:r>
+            <a:r>
+              <a:rPr lang="en-US" sz="1600" dirty="0">
+                <a:latin typeface="Courier New" panose="02070309020205020404" pitchFamily="49" charset="0"/>
+                <a:cs typeface="Courier New" panose="02070309020205020404" pitchFamily="49" charset="0"/>
+              </a:rPr>
+              <a:t>="img_girl.jpg" style="max-width:100%;</a:t>
+            </a:r>
+            <a:r>
+              <a:rPr lang="en-US" sz="1600" dirty="0" err="1">
+                <a:latin typeface="Courier New" panose="02070309020205020404" pitchFamily="49" charset="0"/>
+                <a:cs typeface="Courier New" panose="02070309020205020404" pitchFamily="49" charset="0"/>
+              </a:rPr>
+              <a:t>height:auto</a:t>
+            </a:r>
+            <a:r>
+              <a:rPr lang="en-US" sz="1600" dirty="0" smtClean="0">
+                <a:latin typeface="Courier New" panose="02070309020205020404" pitchFamily="49" charset="0"/>
+                <a:cs typeface="Courier New" panose="02070309020205020404" pitchFamily="49" charset="0"/>
+              </a:rPr>
+              <a:t>;"&gt;</a:t>
+            </a:r>
+            <a:endParaRPr lang="sr-Latn-CS" sz="1600" dirty="0" smtClean="0">
+              <a:latin typeface="Courier New" panose="02070309020205020404" pitchFamily="49" charset="0"/>
+              <a:cs typeface="Courier New" panose="02070309020205020404" pitchFamily="49" charset="0"/>
+            </a:endParaRPr>
+          </a:p>
+          <a:p>
+            <a:r>
+              <a:rPr lang="en-US" sz="1600" dirty="0">
+                <a:latin typeface="Courier New" panose="02070309020205020404" pitchFamily="49" charset="0"/>
+                <a:cs typeface="Courier New" panose="02070309020205020404" pitchFamily="49" charset="0"/>
+              </a:rPr>
+              <a:t>&lt;picture&gt;</a:t>
+            </a:r>
+          </a:p>
+          <a:p>
+            <a:r>
+              <a:rPr lang="en-US" sz="1600" dirty="0">
+                <a:latin typeface="Courier New" panose="02070309020205020404" pitchFamily="49" charset="0"/>
+                <a:cs typeface="Courier New" panose="02070309020205020404" pitchFamily="49" charset="0"/>
+              </a:rPr>
+              <a:t>  &lt;source </a:t>
+            </a:r>
+            <a:r>
+              <a:rPr lang="en-US" sz="1600" dirty="0" err="1">
+                <a:latin typeface="Courier New" panose="02070309020205020404" pitchFamily="49" charset="0"/>
+                <a:cs typeface="Courier New" panose="02070309020205020404" pitchFamily="49" charset="0"/>
+              </a:rPr>
+              <a:t>srcset</a:t>
+            </a:r>
+            <a:r>
+              <a:rPr lang="en-US" sz="1600" dirty="0">
+                <a:latin typeface="Courier New" panose="02070309020205020404" pitchFamily="49" charset="0"/>
+                <a:cs typeface="Courier New" panose="02070309020205020404" pitchFamily="49" charset="0"/>
+              </a:rPr>
+              <a:t>="img_smallflower.jpg" media="(max-width: 600px)"&gt;</a:t>
+            </a:r>
+          </a:p>
+          <a:p>
+            <a:r>
+              <a:rPr lang="en-US" sz="1600" dirty="0">
+                <a:latin typeface="Courier New" panose="02070309020205020404" pitchFamily="49" charset="0"/>
+                <a:cs typeface="Courier New" panose="02070309020205020404" pitchFamily="49" charset="0"/>
+              </a:rPr>
+              <a:t>  &lt;source </a:t>
+            </a:r>
+            <a:r>
+              <a:rPr lang="en-US" sz="1600" dirty="0" err="1">
+                <a:latin typeface="Courier New" panose="02070309020205020404" pitchFamily="49" charset="0"/>
+                <a:cs typeface="Courier New" panose="02070309020205020404" pitchFamily="49" charset="0"/>
+              </a:rPr>
+              <a:t>srcset</a:t>
+            </a:r>
+            <a:r>
+              <a:rPr lang="en-US" sz="1600" dirty="0">
+                <a:latin typeface="Courier New" panose="02070309020205020404" pitchFamily="49" charset="0"/>
+                <a:cs typeface="Courier New" panose="02070309020205020404" pitchFamily="49" charset="0"/>
+              </a:rPr>
+              <a:t>="img_flowers.jpg" media="(max-width: 1500px)"&gt;</a:t>
+            </a:r>
+          </a:p>
+          <a:p>
+            <a:r>
+              <a:rPr lang="en-US" sz="1600" dirty="0">
+                <a:latin typeface="Courier New" panose="02070309020205020404" pitchFamily="49" charset="0"/>
+                <a:cs typeface="Courier New" panose="02070309020205020404" pitchFamily="49" charset="0"/>
+              </a:rPr>
+              <a:t>  &lt;source </a:t>
+            </a:r>
+            <a:r>
+              <a:rPr lang="en-US" sz="1600" dirty="0" err="1">
+                <a:latin typeface="Courier New" panose="02070309020205020404" pitchFamily="49" charset="0"/>
+                <a:cs typeface="Courier New" panose="02070309020205020404" pitchFamily="49" charset="0"/>
+              </a:rPr>
+              <a:t>srcset</a:t>
+            </a:r>
+            <a:r>
+              <a:rPr lang="en-US" sz="1600" dirty="0">
+                <a:latin typeface="Courier New" panose="02070309020205020404" pitchFamily="49" charset="0"/>
+                <a:cs typeface="Courier New" panose="02070309020205020404" pitchFamily="49" charset="0"/>
+              </a:rPr>
+              <a:t>="flowers.jpg"&gt;</a:t>
+            </a:r>
+          </a:p>
+          <a:p>
+            <a:r>
+              <a:rPr lang="en-US" sz="1600" dirty="0">
+                <a:latin typeface="Courier New" panose="02070309020205020404" pitchFamily="49" charset="0"/>
+                <a:cs typeface="Courier New" panose="02070309020205020404" pitchFamily="49" charset="0"/>
+              </a:rPr>
+              <a:t>  &lt;</a:t>
+            </a:r>
+            <a:r>
+              <a:rPr lang="en-US" sz="1600" dirty="0" err="1">
+                <a:latin typeface="Courier New" panose="02070309020205020404" pitchFamily="49" charset="0"/>
+                <a:cs typeface="Courier New" panose="02070309020205020404" pitchFamily="49" charset="0"/>
+              </a:rPr>
+              <a:t>img</a:t>
+            </a:r>
+            <a:r>
+              <a:rPr lang="en-US" sz="1600" dirty="0">
+                <a:latin typeface="Courier New" panose="02070309020205020404" pitchFamily="49" charset="0"/>
+                <a:cs typeface="Courier New" panose="02070309020205020404" pitchFamily="49" charset="0"/>
+              </a:rPr>
+              <a:t> </a:t>
+            </a:r>
+            <a:r>
+              <a:rPr lang="en-US" sz="1600" dirty="0" err="1">
+                <a:latin typeface="Courier New" panose="02070309020205020404" pitchFamily="49" charset="0"/>
+                <a:cs typeface="Courier New" panose="02070309020205020404" pitchFamily="49" charset="0"/>
+              </a:rPr>
+              <a:t>src</a:t>
+            </a:r>
+            <a:r>
+              <a:rPr lang="en-US" sz="1600" dirty="0">
+                <a:latin typeface="Courier New" panose="02070309020205020404" pitchFamily="49" charset="0"/>
+                <a:cs typeface="Courier New" panose="02070309020205020404" pitchFamily="49" charset="0"/>
+              </a:rPr>
+              <a:t>="img_smallflower.jpg" alt="Flowers"&gt;</a:t>
+            </a:r>
+          </a:p>
+          <a:p>
+            <a:r>
+              <a:rPr lang="en-US" sz="1600" dirty="0">
+                <a:latin typeface="Courier New" panose="02070309020205020404" pitchFamily="49" charset="0"/>
+                <a:cs typeface="Courier New" panose="02070309020205020404" pitchFamily="49" charset="0"/>
+              </a:rPr>
+              <a:t>&lt;/picture</a:t>
+            </a:r>
+            <a:r>
+              <a:rPr lang="en-US" sz="1600" dirty="0" smtClean="0">
+                <a:latin typeface="Courier New" panose="02070309020205020404" pitchFamily="49" charset="0"/>
+                <a:cs typeface="Courier New" panose="02070309020205020404" pitchFamily="49" charset="0"/>
+              </a:rPr>
+              <a:t>&gt;</a:t>
+            </a:r>
+            <a:endParaRPr lang="sr-Latn-CS" sz="1600" dirty="0" smtClean="0">
+              <a:latin typeface="Courier New" panose="02070309020205020404" pitchFamily="49" charset="0"/>
+              <a:cs typeface="Courier New" panose="02070309020205020404" pitchFamily="49" charset="0"/>
+            </a:endParaRPr>
+          </a:p>
+          <a:p>
+            <a:r>
+              <a:rPr lang="en-US" sz="1600" dirty="0">
+                <a:latin typeface="Courier New" panose="02070309020205020404" pitchFamily="49" charset="0"/>
+                <a:cs typeface="Courier New" panose="02070309020205020404" pitchFamily="49" charset="0"/>
+              </a:rPr>
+              <a:t>@media screen and (max-width: 800px) {</a:t>
+            </a:r>
+            <a:endParaRPr lang="en-US" sz="1600" dirty="0" smtClean="0">
+              <a:latin typeface="Courier New" panose="02070309020205020404" pitchFamily="49" charset="0"/>
+              <a:cs typeface="Courier New" panose="02070309020205020404" pitchFamily="49" charset="0"/>
+            </a:endParaRPr>
+          </a:p>
+        </p:txBody>
+      </p:sp>
+    </p:spTree>
+    <p:extLst>
+      <p:ext uri="{BB962C8B-B14F-4D97-AF65-F5344CB8AC3E}">
+        <p14:creationId xmlns:p14="http://schemas.microsoft.com/office/powerpoint/2010/main" val="921181862"/>
+      </p:ext>
+    </p:extLst>
+  </p:cSld>
+  <p:clrMapOvr>
+    <a:masterClrMapping/>
+  </p:clrMapOvr>
+</p:sld>
+</file>
+
+<file path=ppt/slides/slide19.xml><?xml version="1.0" encoding="utf-8"?>
+<p:sld xmlns:a="http://schemas.openxmlformats.org/drawingml/2006/main" xmlns:r="http://schemas.openxmlformats.org/officeDocument/2006/relationships" xmlns:p="http://schemas.openxmlformats.org/presentationml/2006/main">
+  <p:cSld>
+    <p:spTree>
+      <p:nvGrpSpPr>
+        <p:cNvPr id="1" name=""/>
+        <p:cNvGrpSpPr/>
+        <p:nvPr/>
+      </p:nvGrpSpPr>
+      <p:grpSpPr>
+        <a:xfrm>
+          <a:off x="0" y="0"/>
+          <a:ext cx="0" cy="0"/>
+          <a:chOff x="0" y="0"/>
+          <a:chExt cx="0" cy="0"/>
+        </a:xfrm>
+      </p:grpSpPr>
+      <p:sp>
+        <p:nvSpPr>
+          <p:cNvPr id="2" name="Title 1"/>
+          <p:cNvSpPr>
+            <a:spLocks noGrp="1"/>
+          </p:cNvSpPr>
+          <p:nvPr>
+            <p:ph type="title"/>
+          </p:nvPr>
+        </p:nvSpPr>
+        <p:spPr/>
+        <p:txBody>
+          <a:bodyPr/>
+          <a:lstStyle/>
+          <a:p>
+            <a:r>
+              <a:rPr lang="en-US" dirty="0"/>
+              <a:t>Media </a:t>
+            </a:r>
+            <a:r>
+              <a:rPr lang="en-US" dirty="0" smtClean="0"/>
+              <a:t>queries</a:t>
+            </a:r>
+            <a:endParaRPr lang="en-US" dirty="0"/>
+          </a:p>
+        </p:txBody>
+      </p:sp>
+    </p:spTree>
+    <p:extLst>
+      <p:ext uri="{BB962C8B-B14F-4D97-AF65-F5344CB8AC3E}">
+        <p14:creationId xmlns:p14="http://schemas.microsoft.com/office/powerpoint/2010/main" val="2078428655"/>
+      </p:ext>
+    </p:extLst>
+  </p:cSld>
+  <p:clrMapOvr>
+    <a:masterClrMapping/>
+  </p:clrMapOvr>
+</p:sld>
+</file>
+
 <file path=ppt/slides/slide2.xml><?xml version="1.0" encoding="utf-8"?>
 <p:sld xmlns:a="http://schemas.openxmlformats.org/drawingml/2006/main" xmlns:r="http://schemas.openxmlformats.org/officeDocument/2006/relationships" xmlns:p="http://schemas.openxmlformats.org/presentationml/2006/main">
   <p:cSld>
@@ -7670,7 +9107,7 @@
           <p:nvPr>
             <p:extLst>
               <p:ext uri="{D42A27DB-BD31-4B8C-83A1-F6EECF244321}">
-                <p14:modId xmlns:p14="http://schemas.microsoft.com/office/powerpoint/2010/main" val="571710413"/>
+                <p14:modId xmlns:p14="http://schemas.microsoft.com/office/powerpoint/2010/main" val="2219585288"/>
               </p:ext>
             </p:extLst>
           </p:nvPr>
@@ -7728,6 +9165,643 @@
 </p:sld>
 </file>
 
+<file path=ppt/slides/slide20.xml><?xml version="1.0" encoding="utf-8"?>
+<p:sld xmlns:a="http://schemas.openxmlformats.org/drawingml/2006/main" xmlns:r="http://schemas.openxmlformats.org/officeDocument/2006/relationships" xmlns:p="http://schemas.openxmlformats.org/presentationml/2006/main">
+  <p:cSld>
+    <p:spTree>
+      <p:nvGrpSpPr>
+        <p:cNvPr id="1" name=""/>
+        <p:cNvGrpSpPr/>
+        <p:nvPr/>
+      </p:nvGrpSpPr>
+      <p:grpSpPr>
+        <a:xfrm>
+          <a:off x="0" y="0"/>
+          <a:ext cx="0" cy="0"/>
+          <a:chOff x="0" y="0"/>
+          <a:chExt cx="0" cy="0"/>
+        </a:xfrm>
+      </p:grpSpPr>
+      <p:sp>
+        <p:nvSpPr>
+          <p:cNvPr id="3" name="Title 2"/>
+          <p:cNvSpPr>
+            <a:spLocks noGrp="1"/>
+          </p:cNvSpPr>
+          <p:nvPr>
+            <p:ph type="title"/>
+          </p:nvPr>
+        </p:nvSpPr>
+        <p:spPr/>
+        <p:txBody>
+          <a:bodyPr/>
+          <a:lstStyle/>
+          <a:p>
+            <a:r>
+              <a:rPr lang="sr-Latn-CS" dirty="0" smtClean="0"/>
+              <a:t>Media queries</a:t>
+            </a:r>
+            <a:endParaRPr lang="en-US" dirty="0"/>
+          </a:p>
+        </p:txBody>
+      </p:sp>
+      <p:sp>
+        <p:nvSpPr>
+          <p:cNvPr id="4" name="Content Placeholder 3"/>
+          <p:cNvSpPr>
+            <a:spLocks noGrp="1"/>
+          </p:cNvSpPr>
+          <p:nvPr>
+            <p:ph sz="quarter" idx="10"/>
+          </p:nvPr>
+        </p:nvSpPr>
+        <p:spPr/>
+        <p:txBody>
+          <a:bodyPr/>
+          <a:lstStyle/>
+          <a:p>
+            <a:endParaRPr lang="en-US" sz="1600" dirty="0" smtClean="0">
+              <a:latin typeface="Courier New" panose="02070309020205020404" pitchFamily="49" charset="0"/>
+              <a:cs typeface="Courier New" panose="02070309020205020404" pitchFamily="49" charset="0"/>
+            </a:endParaRPr>
+          </a:p>
+        </p:txBody>
+      </p:sp>
+      <p:pic>
+        <p:nvPicPr>
+          <p:cNvPr id="7170" name="Picture 2" descr="https://www.w3schools.com/css/rwd_desktop.png"/>
+          <p:cNvPicPr>
+            <a:picLocks noChangeAspect="1" noChangeArrowheads="1"/>
+          </p:cNvPicPr>
+          <p:nvPr/>
+        </p:nvPicPr>
+        <p:blipFill>
+          <a:blip r:embed="rId2">
+            <a:extLst>
+              <a:ext uri="{28A0092B-C50C-407E-A947-70E740481C1C}">
+                <a14:useLocalDpi xmlns:a14="http://schemas.microsoft.com/office/drawing/2010/main" val="0"/>
+              </a:ext>
+            </a:extLst>
+          </a:blip>
+          <a:srcRect/>
+          <a:stretch>
+            <a:fillRect/>
+          </a:stretch>
+        </p:blipFill>
+        <p:spPr bwMode="auto">
+          <a:xfrm>
+            <a:off x="1895475" y="3552031"/>
+            <a:ext cx="2857500" cy="1876425"/>
+          </a:xfrm>
+          <a:prstGeom prst="rect">
+            <a:avLst/>
+          </a:prstGeom>
+          <a:noFill/>
+          <a:ln>
+            <a:solidFill>
+              <a:srgbClr val="FFC000"/>
+            </a:solidFill>
+          </a:ln>
+          <a:extLst>
+            <a:ext uri="{909E8E84-426E-40DD-AFC4-6F175D3DCCD1}">
+              <a14:hiddenFill xmlns:a14="http://schemas.microsoft.com/office/drawing/2010/main">
+                <a:solidFill>
+                  <a:srgbClr val="FFFFFF"/>
+                </a:solidFill>
+              </a14:hiddenFill>
+            </a:ext>
+          </a:extLst>
+        </p:spPr>
+      </p:pic>
+      <p:pic>
+        <p:nvPicPr>
+          <p:cNvPr id="7172" name="Picture 4" descr="https://www.w3schools.com/css/rwd_tablet.png"/>
+          <p:cNvPicPr>
+            <a:picLocks noChangeAspect="1" noChangeArrowheads="1"/>
+          </p:cNvPicPr>
+          <p:nvPr/>
+        </p:nvPicPr>
+        <p:blipFill>
+          <a:blip r:embed="rId3">
+            <a:extLst>
+              <a:ext uri="{28A0092B-C50C-407E-A947-70E740481C1C}">
+                <a14:useLocalDpi xmlns:a14="http://schemas.microsoft.com/office/drawing/2010/main" val="0"/>
+              </a:ext>
+            </a:extLst>
+          </a:blip>
+          <a:srcRect/>
+          <a:stretch>
+            <a:fillRect/>
+          </a:stretch>
+        </p:blipFill>
+        <p:spPr bwMode="auto">
+          <a:xfrm>
+            <a:off x="5524200" y="3552031"/>
+            <a:ext cx="1143000" cy="1676400"/>
+          </a:xfrm>
+          <a:prstGeom prst="rect">
+            <a:avLst/>
+          </a:prstGeom>
+          <a:noFill/>
+          <a:ln>
+            <a:solidFill>
+              <a:srgbClr val="FFC000"/>
+            </a:solidFill>
+          </a:ln>
+          <a:extLst>
+            <a:ext uri="{909E8E84-426E-40DD-AFC4-6F175D3DCCD1}">
+              <a14:hiddenFill xmlns:a14="http://schemas.microsoft.com/office/drawing/2010/main">
+                <a:solidFill>
+                  <a:srgbClr val="FFFFFF"/>
+                </a:solidFill>
+              </a14:hiddenFill>
+            </a:ext>
+          </a:extLst>
+        </p:spPr>
+      </p:pic>
+      <p:pic>
+        <p:nvPicPr>
+          <p:cNvPr id="7174" name="Picture 6" descr="https://www.w3schools.com/css/rwd_phone.png"/>
+          <p:cNvPicPr>
+            <a:picLocks noChangeAspect="1" noChangeArrowheads="1"/>
+          </p:cNvPicPr>
+          <p:nvPr/>
+        </p:nvPicPr>
+        <p:blipFill>
+          <a:blip r:embed="rId4">
+            <a:extLst>
+              <a:ext uri="{28A0092B-C50C-407E-A947-70E740481C1C}">
+                <a14:useLocalDpi xmlns:a14="http://schemas.microsoft.com/office/drawing/2010/main" val="0"/>
+              </a:ext>
+            </a:extLst>
+          </a:blip>
+          <a:srcRect/>
+          <a:stretch>
+            <a:fillRect/>
+          </a:stretch>
+        </p:blipFill>
+        <p:spPr bwMode="auto">
+          <a:xfrm>
+            <a:off x="7438425" y="3552031"/>
+            <a:ext cx="666750" cy="1162050"/>
+          </a:xfrm>
+          <a:prstGeom prst="rect">
+            <a:avLst/>
+          </a:prstGeom>
+          <a:noFill/>
+          <a:ln>
+            <a:solidFill>
+              <a:srgbClr val="FFC000"/>
+            </a:solidFill>
+          </a:ln>
+          <a:extLst>
+            <a:ext uri="{909E8E84-426E-40DD-AFC4-6F175D3DCCD1}">
+              <a14:hiddenFill xmlns:a14="http://schemas.microsoft.com/office/drawing/2010/main">
+                <a:solidFill>
+                  <a:srgbClr val="FFFFFF"/>
+                </a:solidFill>
+              </a14:hiddenFill>
+            </a:ext>
+          </a:extLst>
+        </p:spPr>
+      </p:pic>
+    </p:spTree>
+    <p:extLst>
+      <p:ext uri="{BB962C8B-B14F-4D97-AF65-F5344CB8AC3E}">
+        <p14:creationId xmlns:p14="http://schemas.microsoft.com/office/powerpoint/2010/main" val="3477861996"/>
+      </p:ext>
+    </p:extLst>
+  </p:cSld>
+  <p:clrMapOvr>
+    <a:masterClrMapping/>
+  </p:clrMapOvr>
+</p:sld>
+</file>
+
+<file path=ppt/slides/slide21.xml><?xml version="1.0" encoding="utf-8"?>
+<p:sld xmlns:a="http://schemas.openxmlformats.org/drawingml/2006/main" xmlns:r="http://schemas.openxmlformats.org/officeDocument/2006/relationships" xmlns:p="http://schemas.openxmlformats.org/presentationml/2006/main">
+  <p:cSld>
+    <p:spTree>
+      <p:nvGrpSpPr>
+        <p:cNvPr id="1" name=""/>
+        <p:cNvGrpSpPr/>
+        <p:nvPr/>
+      </p:nvGrpSpPr>
+      <p:grpSpPr>
+        <a:xfrm>
+          <a:off x="0" y="0"/>
+          <a:ext cx="0" cy="0"/>
+          <a:chOff x="0" y="0"/>
+          <a:chExt cx="0" cy="0"/>
+        </a:xfrm>
+      </p:grpSpPr>
+      <p:sp>
+        <p:nvSpPr>
+          <p:cNvPr id="3" name="Title 2"/>
+          <p:cNvSpPr>
+            <a:spLocks noGrp="1"/>
+          </p:cNvSpPr>
+          <p:nvPr>
+            <p:ph type="title"/>
+          </p:nvPr>
+        </p:nvSpPr>
+        <p:spPr/>
+        <p:txBody>
+          <a:bodyPr/>
+          <a:lstStyle/>
+          <a:p>
+            <a:r>
+              <a:rPr lang="sr-Latn-CS" dirty="0" smtClean="0"/>
+              <a:t>Media queries</a:t>
+            </a:r>
+            <a:endParaRPr lang="en-US" dirty="0"/>
+          </a:p>
+        </p:txBody>
+      </p:sp>
+      <p:sp>
+        <p:nvSpPr>
+          <p:cNvPr id="4" name="Content Placeholder 3"/>
+          <p:cNvSpPr>
+            <a:spLocks noGrp="1"/>
+          </p:cNvSpPr>
+          <p:nvPr>
+            <p:ph sz="quarter" idx="10"/>
+          </p:nvPr>
+        </p:nvSpPr>
+        <p:spPr/>
+        <p:txBody>
+          <a:bodyPr/>
+          <a:lstStyle/>
+          <a:p>
+            <a:r>
+              <a:rPr lang="en-US" sz="1400" dirty="0">
+                <a:latin typeface="Courier New" panose="02070309020205020404" pitchFamily="49" charset="0"/>
+                <a:cs typeface="Courier New" panose="02070309020205020404" pitchFamily="49" charset="0"/>
+              </a:rPr>
+              <a:t>/* Extra small devices (phones, 600px and down) */</a:t>
+            </a:r>
+          </a:p>
+          <a:p>
+            <a:r>
+              <a:rPr lang="en-US" sz="1400" dirty="0">
+                <a:latin typeface="Courier New" panose="02070309020205020404" pitchFamily="49" charset="0"/>
+                <a:cs typeface="Courier New" panose="02070309020205020404" pitchFamily="49" charset="0"/>
+              </a:rPr>
+              <a:t>@media only screen and (max-width: 600px) {...} </a:t>
+            </a:r>
+          </a:p>
+          <a:p>
+            <a:r>
+              <a:rPr lang="en-US" sz="1400" dirty="0" smtClean="0">
+                <a:latin typeface="Courier New" panose="02070309020205020404" pitchFamily="49" charset="0"/>
+                <a:cs typeface="Courier New" panose="02070309020205020404" pitchFamily="49" charset="0"/>
+              </a:rPr>
+              <a:t>/* </a:t>
+            </a:r>
+            <a:r>
+              <a:rPr lang="en-US" sz="1400" dirty="0">
+                <a:latin typeface="Courier New" panose="02070309020205020404" pitchFamily="49" charset="0"/>
+                <a:cs typeface="Courier New" panose="02070309020205020404" pitchFamily="49" charset="0"/>
+              </a:rPr>
+              <a:t>Small devices (portrait tablets and large phones, 600px and up) */</a:t>
+            </a:r>
+          </a:p>
+          <a:p>
+            <a:r>
+              <a:rPr lang="en-US" sz="1400" dirty="0">
+                <a:latin typeface="Courier New" panose="02070309020205020404" pitchFamily="49" charset="0"/>
+                <a:cs typeface="Courier New" panose="02070309020205020404" pitchFamily="49" charset="0"/>
+              </a:rPr>
+              <a:t>@media only screen and (min-width: 600px) {...} </a:t>
+            </a:r>
+          </a:p>
+          <a:p>
+            <a:r>
+              <a:rPr lang="en-US" sz="1400" dirty="0" smtClean="0">
+                <a:latin typeface="Courier New" panose="02070309020205020404" pitchFamily="49" charset="0"/>
+                <a:cs typeface="Courier New" panose="02070309020205020404" pitchFamily="49" charset="0"/>
+              </a:rPr>
+              <a:t>/* </a:t>
+            </a:r>
+            <a:r>
+              <a:rPr lang="en-US" sz="1400" dirty="0">
+                <a:latin typeface="Courier New" panose="02070309020205020404" pitchFamily="49" charset="0"/>
+                <a:cs typeface="Courier New" panose="02070309020205020404" pitchFamily="49" charset="0"/>
+              </a:rPr>
+              <a:t>Medium devices (landscape tablets, 768px and up) */</a:t>
+            </a:r>
+          </a:p>
+          <a:p>
+            <a:r>
+              <a:rPr lang="en-US" sz="1400" dirty="0">
+                <a:latin typeface="Courier New" panose="02070309020205020404" pitchFamily="49" charset="0"/>
+                <a:cs typeface="Courier New" panose="02070309020205020404" pitchFamily="49" charset="0"/>
+              </a:rPr>
+              <a:t>@media only screen and (min-width: 768px) {...} </a:t>
+            </a:r>
+          </a:p>
+          <a:p>
+            <a:r>
+              <a:rPr lang="en-US" sz="1400" dirty="0" smtClean="0">
+                <a:latin typeface="Courier New" panose="02070309020205020404" pitchFamily="49" charset="0"/>
+                <a:cs typeface="Courier New" panose="02070309020205020404" pitchFamily="49" charset="0"/>
+              </a:rPr>
+              <a:t>/* </a:t>
+            </a:r>
+            <a:r>
+              <a:rPr lang="en-US" sz="1400" dirty="0">
+                <a:latin typeface="Courier New" panose="02070309020205020404" pitchFamily="49" charset="0"/>
+                <a:cs typeface="Courier New" panose="02070309020205020404" pitchFamily="49" charset="0"/>
+              </a:rPr>
+              <a:t>Large devices (laptops/desktops, 992px and up) */</a:t>
+            </a:r>
+          </a:p>
+          <a:p>
+            <a:r>
+              <a:rPr lang="en-US" sz="1400" dirty="0">
+                <a:latin typeface="Courier New" panose="02070309020205020404" pitchFamily="49" charset="0"/>
+                <a:cs typeface="Courier New" panose="02070309020205020404" pitchFamily="49" charset="0"/>
+              </a:rPr>
+              <a:t>@media only screen and (min-width: 992px) {...} </a:t>
+            </a:r>
+          </a:p>
+          <a:p>
+            <a:r>
+              <a:rPr lang="en-US" sz="1400" dirty="0" smtClean="0">
+                <a:latin typeface="Courier New" panose="02070309020205020404" pitchFamily="49" charset="0"/>
+                <a:cs typeface="Courier New" panose="02070309020205020404" pitchFamily="49" charset="0"/>
+              </a:rPr>
+              <a:t>/* </a:t>
+            </a:r>
+            <a:r>
+              <a:rPr lang="en-US" sz="1400" dirty="0">
+                <a:latin typeface="Courier New" panose="02070309020205020404" pitchFamily="49" charset="0"/>
+                <a:cs typeface="Courier New" panose="02070309020205020404" pitchFamily="49" charset="0"/>
+              </a:rPr>
+              <a:t>Extra large devices (large laptops and desktops, 1200px and up) */</a:t>
+            </a:r>
+          </a:p>
+          <a:p>
+            <a:r>
+              <a:rPr lang="en-US" sz="1400" dirty="0">
+                <a:latin typeface="Courier New" panose="02070309020205020404" pitchFamily="49" charset="0"/>
+                <a:cs typeface="Courier New" panose="02070309020205020404" pitchFamily="49" charset="0"/>
+              </a:rPr>
+              <a:t>@media only screen and (min-width: 1200px) {...}</a:t>
+            </a:r>
+            <a:endParaRPr lang="en-US" sz="1400" dirty="0" smtClean="0">
+              <a:latin typeface="Courier New" panose="02070309020205020404" pitchFamily="49" charset="0"/>
+              <a:cs typeface="Courier New" panose="02070309020205020404" pitchFamily="49" charset="0"/>
+            </a:endParaRPr>
+          </a:p>
+        </p:txBody>
+      </p:sp>
+    </p:spTree>
+    <p:extLst>
+      <p:ext uri="{BB962C8B-B14F-4D97-AF65-F5344CB8AC3E}">
+        <p14:creationId xmlns:p14="http://schemas.microsoft.com/office/powerpoint/2010/main" val="1782927253"/>
+      </p:ext>
+    </p:extLst>
+  </p:cSld>
+  <p:clrMapOvr>
+    <a:masterClrMapping/>
+  </p:clrMapOvr>
+</p:sld>
+</file>
+
+<file path=ppt/slides/slide22.xml><?xml version="1.0" encoding="utf-8"?>
+<p:sld xmlns:a="http://schemas.openxmlformats.org/drawingml/2006/main" xmlns:r="http://schemas.openxmlformats.org/officeDocument/2006/relationships" xmlns:p="http://schemas.openxmlformats.org/presentationml/2006/main">
+  <p:cSld>
+    <p:spTree>
+      <p:nvGrpSpPr>
+        <p:cNvPr id="1" name=""/>
+        <p:cNvGrpSpPr/>
+        <p:nvPr/>
+      </p:nvGrpSpPr>
+      <p:grpSpPr>
+        <a:xfrm>
+          <a:off x="0" y="0"/>
+          <a:ext cx="0" cy="0"/>
+          <a:chOff x="0" y="0"/>
+          <a:chExt cx="0" cy="0"/>
+        </a:xfrm>
+      </p:grpSpPr>
+      <p:sp>
+        <p:nvSpPr>
+          <p:cNvPr id="2" name="Title 1"/>
+          <p:cNvSpPr>
+            <a:spLocks noGrp="1"/>
+          </p:cNvSpPr>
+          <p:nvPr>
+            <p:ph type="title"/>
+          </p:nvPr>
+        </p:nvSpPr>
+        <p:spPr/>
+        <p:txBody>
+          <a:bodyPr/>
+          <a:lstStyle/>
+          <a:p>
+            <a:r>
+              <a:rPr lang="en-US" dirty="0" err="1" smtClean="0"/>
+              <a:t>Ve</a:t>
+            </a:r>
+            <a:r>
+              <a:rPr lang="sr-Latn-CS" dirty="0" smtClean="0"/>
+              <a:t>ž</a:t>
+            </a:r>
+            <a:r>
+              <a:rPr lang="en-US" dirty="0" smtClean="0"/>
+              <a:t>be</a:t>
+            </a:r>
+            <a:endParaRPr lang="en-US" dirty="0"/>
+          </a:p>
+        </p:txBody>
+      </p:sp>
+    </p:spTree>
+    <p:extLst>
+      <p:ext uri="{BB962C8B-B14F-4D97-AF65-F5344CB8AC3E}">
+        <p14:creationId xmlns:p14="http://schemas.microsoft.com/office/powerpoint/2010/main" val="2153955968"/>
+      </p:ext>
+    </p:extLst>
+  </p:cSld>
+  <p:clrMapOvr>
+    <a:masterClrMapping/>
+  </p:clrMapOvr>
+</p:sld>
+</file>
+
+<file path=ppt/slides/slide23.xml><?xml version="1.0" encoding="utf-8"?>
+<p:sld xmlns:a="http://schemas.openxmlformats.org/drawingml/2006/main" xmlns:r="http://schemas.openxmlformats.org/officeDocument/2006/relationships" xmlns:p="http://schemas.openxmlformats.org/presentationml/2006/main">
+  <p:cSld>
+    <p:spTree>
+      <p:nvGrpSpPr>
+        <p:cNvPr id="1" name=""/>
+        <p:cNvGrpSpPr/>
+        <p:nvPr/>
+      </p:nvGrpSpPr>
+      <p:grpSpPr>
+        <a:xfrm>
+          <a:off x="0" y="0"/>
+          <a:ext cx="0" cy="0"/>
+          <a:chOff x="0" y="0"/>
+          <a:chExt cx="0" cy="0"/>
+        </a:xfrm>
+      </p:grpSpPr>
+      <p:sp>
+        <p:nvSpPr>
+          <p:cNvPr id="2" name="Title 1"/>
+          <p:cNvSpPr>
+            <a:spLocks noGrp="1"/>
+          </p:cNvSpPr>
+          <p:nvPr>
+            <p:ph type="title"/>
+          </p:nvPr>
+        </p:nvSpPr>
+        <p:spPr/>
+        <p:txBody>
+          <a:bodyPr/>
+          <a:lstStyle/>
+          <a:p>
+            <a:r>
+              <a:rPr lang="sr-Latn-CS" dirty="0" smtClean="0"/>
+              <a:t>Vežba 1</a:t>
+            </a:r>
+            <a:endParaRPr lang="en-US" dirty="0"/>
+          </a:p>
+        </p:txBody>
+      </p:sp>
+      <p:pic>
+        <p:nvPicPr>
+          <p:cNvPr id="6" name="Content Placeholder 5"/>
+          <p:cNvPicPr>
+            <a:picLocks noGrp="1" noChangeAspect="1"/>
+          </p:cNvPicPr>
+          <p:nvPr>
+            <p:ph sz="quarter" idx="10"/>
+          </p:nvPr>
+        </p:nvPicPr>
+        <p:blipFill>
+          <a:blip r:embed="rId2"/>
+          <a:stretch>
+            <a:fillRect/>
+          </a:stretch>
+        </p:blipFill>
+        <p:spPr>
+          <a:xfrm>
+            <a:off x="609480" y="1418399"/>
+            <a:ext cx="7658220" cy="4470745"/>
+          </a:xfrm>
+          <a:prstGeom prst="rect">
+            <a:avLst/>
+          </a:prstGeom>
+        </p:spPr>
+      </p:pic>
+    </p:spTree>
+    <p:extLst>
+      <p:ext uri="{BB962C8B-B14F-4D97-AF65-F5344CB8AC3E}">
+        <p14:creationId xmlns:p14="http://schemas.microsoft.com/office/powerpoint/2010/main" val="1953357383"/>
+      </p:ext>
+    </p:extLst>
+  </p:cSld>
+  <p:clrMapOvr>
+    <a:masterClrMapping/>
+  </p:clrMapOvr>
+</p:sld>
+</file>
+
+<file path=ppt/slides/slide24.xml><?xml version="1.0" encoding="utf-8"?>
+<p:sld xmlns:a="http://schemas.openxmlformats.org/drawingml/2006/main" xmlns:r="http://schemas.openxmlformats.org/officeDocument/2006/relationships" xmlns:p="http://schemas.openxmlformats.org/presentationml/2006/main">
+  <p:cSld>
+    <p:spTree>
+      <p:nvGrpSpPr>
+        <p:cNvPr id="1" name=""/>
+        <p:cNvGrpSpPr/>
+        <p:nvPr/>
+      </p:nvGrpSpPr>
+      <p:grpSpPr>
+        <a:xfrm>
+          <a:off x="0" y="0"/>
+          <a:ext cx="0" cy="0"/>
+          <a:chOff x="0" y="0"/>
+          <a:chExt cx="0" cy="0"/>
+        </a:xfrm>
+      </p:grpSpPr>
+      <p:sp>
+        <p:nvSpPr>
+          <p:cNvPr id="2" name="Title 1"/>
+          <p:cNvSpPr>
+            <a:spLocks noGrp="1"/>
+          </p:cNvSpPr>
+          <p:nvPr>
+            <p:ph type="title"/>
+          </p:nvPr>
+        </p:nvSpPr>
+        <p:spPr/>
+        <p:txBody>
+          <a:bodyPr/>
+          <a:lstStyle/>
+          <a:p>
+            <a:r>
+              <a:rPr lang="en-US" dirty="0" err="1" smtClean="0"/>
+              <a:t>Ve</a:t>
+            </a:r>
+            <a:r>
+              <a:rPr lang="sr-Latn-CS" dirty="0" smtClean="0"/>
+              <a:t>ž</a:t>
+            </a:r>
+            <a:r>
+              <a:rPr lang="en-US" dirty="0" smtClean="0"/>
+              <a:t>b</a:t>
+            </a:r>
+            <a:r>
+              <a:rPr lang="sr-Latn-CS" dirty="0" smtClean="0"/>
+              <a:t>a 2</a:t>
+            </a:r>
+            <a:endParaRPr lang="en-US" dirty="0"/>
+          </a:p>
+        </p:txBody>
+      </p:sp>
+      <p:pic>
+        <p:nvPicPr>
+          <p:cNvPr id="4" name="Content Placeholder 3"/>
+          <p:cNvPicPr>
+            <a:picLocks noGrp="1" noChangeAspect="1"/>
+          </p:cNvPicPr>
+          <p:nvPr>
+            <p:ph sz="quarter" idx="10"/>
+          </p:nvPr>
+        </p:nvPicPr>
+        <p:blipFill rotWithShape="1">
+          <a:blip r:embed="rId2" cstate="print">
+            <a:extLst>
+              <a:ext uri="{28A0092B-C50C-407E-A947-70E740481C1C}">
+                <a14:useLocalDpi xmlns:a14="http://schemas.microsoft.com/office/drawing/2010/main" val="0"/>
+              </a:ext>
+            </a:extLst>
+          </a:blip>
+          <a:srcRect b="63633"/>
+          <a:stretch/>
+        </p:blipFill>
+        <p:spPr>
+          <a:xfrm>
+            <a:off x="609479" y="1418400"/>
+            <a:ext cx="9253697" cy="4487100"/>
+          </a:xfrm>
+        </p:spPr>
+      </p:pic>
+    </p:spTree>
+    <p:extLst>
+      <p:ext uri="{BB962C8B-B14F-4D97-AF65-F5344CB8AC3E}">
+        <p14:creationId xmlns:p14="http://schemas.microsoft.com/office/powerpoint/2010/main" val="1530457716"/>
+      </p:ext>
+    </p:extLst>
+  </p:cSld>
+  <p:clrMapOvr>
+    <a:masterClrMapping/>
+  </p:clrMapOvr>
+</p:sld>
+</file>
+
 <file path=ppt/slides/slide3.xml><?xml version="1.0" encoding="utf-8"?>
 <p:sld xmlns:a="http://schemas.openxmlformats.org/drawingml/2006/main" xmlns:r="http://schemas.openxmlformats.org/officeDocument/2006/relationships" xmlns:p="http://schemas.openxmlformats.org/presentationml/2006/main">
   <p:cSld>
@@ -7774,34 +9848,9 @@
           </a:p>
         </p:txBody>
       </p:sp>
-      <p:sp>
-        <p:nvSpPr>
-          <p:cNvPr id="3" name="Content Placeholder 2"/>
-          <p:cNvSpPr>
-            <a:spLocks noGrp="1"/>
-          </p:cNvSpPr>
-          <p:nvPr>
-            <p:ph sz="half" idx="4294967295"/>
-          </p:nvPr>
-        </p:nvSpPr>
-        <p:spPr>
-          <a:xfrm>
-            <a:off x="0" y="1825625"/>
-            <a:ext cx="5570538" cy="4351338"/>
-          </a:xfrm>
-        </p:spPr>
-        <p:txBody>
-          <a:bodyPr/>
-          <a:lstStyle/>
-          <a:p>
-            <a:pPr lvl="1"/>
-            <a:endParaRPr lang="en-US" smtClean="0"/>
-          </a:p>
-        </p:txBody>
-      </p:sp>
       <p:pic>
         <p:nvPicPr>
-          <p:cNvPr id="9" name="Picture 8"/>
+          <p:cNvPr id="3" name="Picture 2"/>
           <p:cNvPicPr>
             <a:picLocks noChangeAspect="1"/>
           </p:cNvPicPr>
@@ -7815,8 +9864,8 @@
         </p:blipFill>
         <p:spPr>
           <a:xfrm>
-            <a:off x="10053638" y="4719332"/>
-            <a:ext cx="2138362" cy="2138362"/>
+            <a:off x="609480" y="1418400"/>
+            <a:ext cx="7556620" cy="4411432"/>
           </a:xfrm>
           <a:prstGeom prst="rect">
             <a:avLst/>
@@ -7862,12 +9911,12 @@
       </p:grpSpPr>
       <p:sp>
         <p:nvSpPr>
-          <p:cNvPr id="5" name="Text Placeholder 4"/>
+          <p:cNvPr id="4" name="Title 3"/>
           <p:cNvSpPr>
             <a:spLocks noGrp="1"/>
           </p:cNvSpPr>
           <p:nvPr>
-            <p:ph type="body" sz="quarter" idx="10"/>
+            <p:ph type="title"/>
           </p:nvPr>
         </p:nvSpPr>
         <p:spPr/>
@@ -7876,59 +9925,566 @@
           <a:lstStyle/>
           <a:p>
             <a:r>
-              <a:rPr lang="en-US" smtClean="0"/>
-              <a:t>HTML</a:t>
-            </a:r>
-            <a:endParaRPr lang="sr-Latn-RS" smtClean="0"/>
+              <a:rPr lang="en-US" dirty="0" smtClean="0"/>
+              <a:t>Dana</a:t>
+            </a:r>
+            <a:r>
+              <a:rPr lang="sr-Latn-CS" dirty="0" smtClean="0"/>
+              <a:t>šnje teme</a:t>
+            </a:r>
+            <a:endParaRPr lang="en-US" dirty="0"/>
           </a:p>
         </p:txBody>
       </p:sp>
       <p:sp>
         <p:nvSpPr>
-          <p:cNvPr id="6" name="Text Placeholder 5"/>
+          <p:cNvPr id="5" name="Content Placeholder 4"/>
           <p:cNvSpPr>
             <a:spLocks noGrp="1"/>
           </p:cNvSpPr>
           <p:nvPr>
-            <p:ph type="body" sz="quarter" idx="4294967295"/>
-          </p:nvPr>
-        </p:nvSpPr>
-        <p:spPr>
-          <a:xfrm>
-            <a:off x="7368309" y="3196013"/>
-            <a:ext cx="4699000" cy="1930400"/>
-          </a:xfrm>
-        </p:spPr>
+            <p:ph sz="quarter" idx="10"/>
+          </p:nvPr>
+        </p:nvSpPr>
+        <p:spPr/>
         <p:txBody>
           <a:bodyPr/>
           <a:lstStyle/>
           <a:p>
-            <a:pPr lvl="0"/>
-            <a:r>
-              <a:rPr lang="en-US" sz="4000" smtClean="0"/>
-              <a:t>text</a:t>
-            </a:r>
-            <a:endParaRPr lang="en-US" sz="4000"/>
+            <a:r>
+              <a:rPr lang="en-US" dirty="0"/>
+              <a:t>Layouts, </a:t>
+            </a:r>
+            <a:endParaRPr lang="en-US" dirty="0" smtClean="0"/>
+          </a:p>
+          <a:p>
+            <a:r>
+              <a:rPr lang="en-US" dirty="0" smtClean="0"/>
+              <a:t>Responsive </a:t>
+            </a:r>
+            <a:r>
+              <a:rPr lang="en-US" dirty="0"/>
+              <a:t>design, </a:t>
+            </a:r>
+            <a:endParaRPr lang="en-US" dirty="0" smtClean="0"/>
+          </a:p>
+          <a:p>
+            <a:r>
+              <a:rPr lang="en-US" dirty="0" smtClean="0"/>
+              <a:t>Media </a:t>
+            </a:r>
+            <a:r>
+              <a:rPr lang="en-US" dirty="0"/>
+              <a:t>queries</a:t>
+            </a:r>
+            <a:endParaRPr lang="en-US" dirty="0" smtClean="0"/>
           </a:p>
         </p:txBody>
       </p:sp>
     </p:spTree>
     <p:extLst>
       <p:ext uri="{BB962C8B-B14F-4D97-AF65-F5344CB8AC3E}">
-        <p14:creationId xmlns:p14="http://schemas.microsoft.com/office/powerpoint/2010/main" val="1530407426"/>
+        <p14:creationId xmlns:p14="http://schemas.microsoft.com/office/powerpoint/2010/main" val="428666577"/>
       </p:ext>
     </p:extLst>
   </p:cSld>
   <p:clrMapOvr>
     <a:masterClrMapping/>
   </p:clrMapOvr>
-  <p:timing>
-    <p:tnLst>
-      <p:par>
-        <p:cTn id="1" dur="indefinite" restart="never" nodeType="tmRoot"/>
-      </p:par>
-    </p:tnLst>
-  </p:timing>
+</p:sld>
+</file>
+
+<file path=ppt/slides/slide5.xml><?xml version="1.0" encoding="utf-8"?>
+<p:sld xmlns:a="http://schemas.openxmlformats.org/drawingml/2006/main" xmlns:r="http://schemas.openxmlformats.org/officeDocument/2006/relationships" xmlns:p="http://schemas.openxmlformats.org/presentationml/2006/main">
+  <p:cSld>
+    <p:spTree>
+      <p:nvGrpSpPr>
+        <p:cNvPr id="1" name=""/>
+        <p:cNvGrpSpPr/>
+        <p:nvPr/>
+      </p:nvGrpSpPr>
+      <p:grpSpPr>
+        <a:xfrm>
+          <a:off x="0" y="0"/>
+          <a:ext cx="0" cy="0"/>
+          <a:chOff x="0" y="0"/>
+          <a:chExt cx="0" cy="0"/>
+        </a:xfrm>
+      </p:grpSpPr>
+      <p:sp>
+        <p:nvSpPr>
+          <p:cNvPr id="5" name="Title 4"/>
+          <p:cNvSpPr>
+            <a:spLocks noGrp="1"/>
+          </p:cNvSpPr>
+          <p:nvPr>
+            <p:ph type="title"/>
+          </p:nvPr>
+        </p:nvSpPr>
+        <p:spPr/>
+        <p:txBody>
+          <a:bodyPr/>
+          <a:lstStyle/>
+          <a:p>
+            <a:r>
+              <a:rPr lang="sr-Latn-CS" dirty="0" smtClean="0"/>
+              <a:t>CSS size units</a:t>
+            </a:r>
+            <a:endParaRPr lang="en-US" dirty="0"/>
+          </a:p>
+        </p:txBody>
+      </p:sp>
+      <p:sp>
+        <p:nvSpPr>
+          <p:cNvPr id="6" name="Content Placeholder 5"/>
+          <p:cNvSpPr>
+            <a:spLocks noGrp="1"/>
+          </p:cNvSpPr>
+          <p:nvPr>
+            <p:ph sz="quarter" idx="10"/>
+          </p:nvPr>
+        </p:nvSpPr>
+        <p:spPr/>
+        <p:txBody>
+          <a:bodyPr/>
+          <a:lstStyle/>
+          <a:p>
+            <a:r>
+              <a:rPr lang="sr-Latn-CS" sz="2400" dirty="0" smtClean="0"/>
+              <a:t>Numeric units:</a:t>
+            </a:r>
+          </a:p>
+          <a:p>
+            <a:pPr lvl="1"/>
+            <a:r>
+              <a:rPr lang="sr-Latn-CS" sz="2000" dirty="0" smtClean="0"/>
+              <a:t>px - Pixels, </a:t>
+            </a:r>
+          </a:p>
+          <a:p>
+            <a:pPr lvl="1"/>
+            <a:r>
+              <a:rPr lang="sr-Latn-CS" sz="2000" dirty="0" smtClean="0"/>
+              <a:t>mm, cm, in, pt, pc;</a:t>
+            </a:r>
+          </a:p>
+          <a:p>
+            <a:r>
+              <a:rPr lang="sr-Latn-CS" sz="2400" dirty="0" smtClean="0"/>
+              <a:t>Relative units:</a:t>
+            </a:r>
+          </a:p>
+          <a:p>
+            <a:pPr lvl="1"/>
+            <a:r>
+              <a:rPr lang="sr-Latn-CS" sz="2000" dirty="0" smtClean="0"/>
+              <a:t>em - </a:t>
+            </a:r>
+            <a:r>
+              <a:rPr lang="en-US" sz="2000" dirty="0" smtClean="0"/>
+              <a:t>1em</a:t>
+            </a:r>
+            <a:r>
+              <a:rPr lang="sr-Latn-CS" sz="2000" dirty="0" smtClean="0"/>
+              <a:t> je veličina fonta u trenutnom elementu, preciznije</a:t>
+            </a:r>
+            <a:r>
+              <a:rPr lang="en-US" sz="2000" dirty="0" smtClean="0"/>
+              <a:t>, </a:t>
+            </a:r>
+            <a:r>
+              <a:rPr lang="sr-Latn-CS" sz="2000" dirty="0" smtClean="0"/>
+              <a:t>širina </a:t>
+            </a:r>
+            <a:r>
+              <a:rPr lang="en-US" sz="2000" dirty="0" smtClean="0"/>
+              <a:t>M</a:t>
+            </a:r>
+            <a:endParaRPr lang="sr-Latn-CS" sz="2000" dirty="0" smtClean="0"/>
+          </a:p>
+          <a:p>
+            <a:pPr lvl="1"/>
+            <a:r>
+              <a:rPr lang="sr-Latn-CS" sz="2000" dirty="0" smtClean="0"/>
+              <a:t>rem - </a:t>
+            </a:r>
+            <a:r>
+              <a:rPr lang="en-US" sz="2000" dirty="0"/>
+              <a:t>(root </a:t>
+            </a:r>
+            <a:r>
+              <a:rPr lang="en-US" sz="2000" dirty="0" err="1"/>
+              <a:t>em</a:t>
+            </a:r>
+            <a:r>
+              <a:rPr lang="en-US" sz="2000" dirty="0"/>
+              <a:t>) </a:t>
+            </a:r>
+            <a:r>
+              <a:rPr lang="sr-Latn-CS" sz="2000" dirty="0" smtClean="0"/>
+              <a:t>Je isto što i </a:t>
+            </a:r>
+            <a:r>
+              <a:rPr lang="en-US" sz="2000" dirty="0" err="1" smtClean="0"/>
+              <a:t>em</a:t>
+            </a:r>
+            <a:r>
+              <a:rPr lang="en-US" sz="2000" dirty="0"/>
+              <a:t>, </a:t>
+            </a:r>
+            <a:r>
+              <a:rPr lang="sr-Latn-CS" sz="2000" dirty="0" smtClean="0"/>
+              <a:t>ali u odnosu na base font brovsera</a:t>
+            </a:r>
+          </a:p>
+          <a:p>
+            <a:pPr lvl="1"/>
+            <a:r>
+              <a:rPr lang="sr-Latn-CS" sz="2000" dirty="0" smtClean="0"/>
+              <a:t>vw, vh – Je 1</a:t>
+            </a:r>
+            <a:r>
+              <a:rPr lang="en-US" sz="2000" dirty="0" smtClean="0"/>
+              <a:t>/100</a:t>
+            </a:r>
+            <a:r>
+              <a:rPr lang="sr-Latn-CS" sz="2000" dirty="0" smtClean="0"/>
+              <a:t> delova širine odnosno visine vidljivog dijela ekrana</a:t>
+            </a:r>
+          </a:p>
+        </p:txBody>
+      </p:sp>
+    </p:spTree>
+    <p:extLst>
+      <p:ext uri="{BB962C8B-B14F-4D97-AF65-F5344CB8AC3E}">
+        <p14:creationId xmlns:p14="http://schemas.microsoft.com/office/powerpoint/2010/main" val="57368787"/>
+      </p:ext>
+    </p:extLst>
+  </p:cSld>
+  <p:clrMapOvr>
+    <a:masterClrMapping/>
+  </p:clrMapOvr>
+</p:sld>
+</file>
+
+<file path=ppt/slides/slide6.xml><?xml version="1.0" encoding="utf-8"?>
+<p:sld xmlns:a="http://schemas.openxmlformats.org/drawingml/2006/main" xmlns:r="http://schemas.openxmlformats.org/officeDocument/2006/relationships" xmlns:p="http://schemas.openxmlformats.org/presentationml/2006/main">
+  <p:cSld>
+    <p:spTree>
+      <p:nvGrpSpPr>
+        <p:cNvPr id="1" name=""/>
+        <p:cNvGrpSpPr/>
+        <p:nvPr/>
+      </p:nvGrpSpPr>
+      <p:grpSpPr>
+        <a:xfrm>
+          <a:off x="0" y="0"/>
+          <a:ext cx="0" cy="0"/>
+          <a:chOff x="0" y="0"/>
+          <a:chExt cx="0" cy="0"/>
+        </a:xfrm>
+      </p:grpSpPr>
+      <p:sp>
+        <p:nvSpPr>
+          <p:cNvPr id="5" name="Title 4"/>
+          <p:cNvSpPr>
+            <a:spLocks noGrp="1"/>
+          </p:cNvSpPr>
+          <p:nvPr>
+            <p:ph type="title"/>
+          </p:nvPr>
+        </p:nvSpPr>
+        <p:spPr/>
+        <p:txBody>
+          <a:bodyPr/>
+          <a:lstStyle/>
+          <a:p>
+            <a:r>
+              <a:rPr lang="sr-Latn-CS" dirty="0" smtClean="0"/>
+              <a:t>PPI/PPCM – Pixel per inch/cm</a:t>
+            </a:r>
+            <a:endParaRPr lang="en-US" dirty="0"/>
+          </a:p>
+        </p:txBody>
+      </p:sp>
+      <p:pic>
+        <p:nvPicPr>
+          <p:cNvPr id="4098" name="Picture 2" descr="Image result for pixel density"/>
+          <p:cNvPicPr>
+            <a:picLocks noGrp="1" noChangeAspect="1" noChangeArrowheads="1"/>
+          </p:cNvPicPr>
+          <p:nvPr>
+            <p:ph sz="quarter" idx="10"/>
+          </p:nvPr>
+        </p:nvPicPr>
+        <p:blipFill>
+          <a:blip r:embed="rId2" cstate="print">
+            <a:extLst>
+              <a:ext uri="{28A0092B-C50C-407E-A947-70E740481C1C}">
+                <a14:useLocalDpi xmlns:a14="http://schemas.microsoft.com/office/drawing/2010/main" val="0"/>
+              </a:ext>
+            </a:extLst>
+          </a:blip>
+          <a:srcRect/>
+          <a:stretch>
+            <a:fillRect/>
+          </a:stretch>
+        </p:blipFill>
+        <p:spPr bwMode="auto">
+          <a:xfrm>
+            <a:off x="2413318" y="1754188"/>
+            <a:ext cx="5420676" cy="3871912"/>
+          </a:xfrm>
+          <a:prstGeom prst="rect">
+            <a:avLst/>
+          </a:prstGeom>
+          <a:noFill/>
+          <a:extLst>
+            <a:ext uri="{909E8E84-426E-40DD-AFC4-6F175D3DCCD1}">
+              <a14:hiddenFill xmlns:a14="http://schemas.microsoft.com/office/drawing/2010/main">
+                <a:solidFill>
+                  <a:srgbClr val="FFFFFF"/>
+                </a:solidFill>
+              </a14:hiddenFill>
+            </a:ext>
+          </a:extLst>
+        </p:spPr>
+      </p:pic>
+    </p:spTree>
+    <p:extLst>
+      <p:ext uri="{BB962C8B-B14F-4D97-AF65-F5344CB8AC3E}">
+        <p14:creationId xmlns:p14="http://schemas.microsoft.com/office/powerpoint/2010/main" val="528408161"/>
+      </p:ext>
+    </p:extLst>
+  </p:cSld>
+  <p:clrMapOvr>
+    <a:masterClrMapping/>
+  </p:clrMapOvr>
+</p:sld>
+</file>
+
+<file path=ppt/slides/slide7.xml><?xml version="1.0" encoding="utf-8"?>
+<p:sld xmlns:a="http://schemas.openxmlformats.org/drawingml/2006/main" xmlns:r="http://schemas.openxmlformats.org/officeDocument/2006/relationships" xmlns:p="http://schemas.openxmlformats.org/presentationml/2006/main">
+  <p:cSld>
+    <p:spTree>
+      <p:nvGrpSpPr>
+        <p:cNvPr id="1" name=""/>
+        <p:cNvGrpSpPr/>
+        <p:nvPr/>
+      </p:nvGrpSpPr>
+      <p:grpSpPr>
+        <a:xfrm>
+          <a:off x="0" y="0"/>
+          <a:ext cx="0" cy="0"/>
+          <a:chOff x="0" y="0"/>
+          <a:chExt cx="0" cy="0"/>
+        </a:xfrm>
+      </p:grpSpPr>
+      <p:sp>
+        <p:nvSpPr>
+          <p:cNvPr id="2" name="Title 1"/>
+          <p:cNvSpPr>
+            <a:spLocks noGrp="1"/>
+          </p:cNvSpPr>
+          <p:nvPr>
+            <p:ph type="title"/>
+          </p:nvPr>
+        </p:nvSpPr>
+        <p:spPr/>
+        <p:txBody>
+          <a:bodyPr/>
+          <a:lstStyle/>
+          <a:p>
+            <a:r>
+              <a:rPr lang="en-US" dirty="0" smtClean="0"/>
+              <a:t>CSS </a:t>
+            </a:r>
+            <a:r>
+              <a:rPr lang="sr-Latn-CS" dirty="0" smtClean="0"/>
+              <a:t>Layout</a:t>
+            </a:r>
+            <a:endParaRPr lang="en-US" dirty="0"/>
+          </a:p>
+        </p:txBody>
+      </p:sp>
+    </p:spTree>
+    <p:extLst>
+      <p:ext uri="{BB962C8B-B14F-4D97-AF65-F5344CB8AC3E}">
+        <p14:creationId xmlns:p14="http://schemas.microsoft.com/office/powerpoint/2010/main" val="424198968"/>
+      </p:ext>
+    </p:extLst>
+  </p:cSld>
+  <p:clrMapOvr>
+    <a:masterClrMapping/>
+  </p:clrMapOvr>
+</p:sld>
+</file>
+
+<file path=ppt/slides/slide8.xml><?xml version="1.0" encoding="utf-8"?>
+<p:sld xmlns:a="http://schemas.openxmlformats.org/drawingml/2006/main" xmlns:r="http://schemas.openxmlformats.org/officeDocument/2006/relationships" xmlns:p="http://schemas.openxmlformats.org/presentationml/2006/main">
+  <p:cSld>
+    <p:spTree>
+      <p:nvGrpSpPr>
+        <p:cNvPr id="1" name=""/>
+        <p:cNvGrpSpPr/>
+        <p:nvPr/>
+      </p:nvGrpSpPr>
+      <p:grpSpPr>
+        <a:xfrm>
+          <a:off x="0" y="0"/>
+          <a:ext cx="0" cy="0"/>
+          <a:chOff x="0" y="0"/>
+          <a:chExt cx="0" cy="0"/>
+        </a:xfrm>
+      </p:grpSpPr>
+      <p:sp>
+        <p:nvSpPr>
+          <p:cNvPr id="5" name="Title 4"/>
+          <p:cNvSpPr>
+            <a:spLocks noGrp="1"/>
+          </p:cNvSpPr>
+          <p:nvPr>
+            <p:ph type="title"/>
+          </p:nvPr>
+        </p:nvSpPr>
+        <p:spPr/>
+        <p:txBody>
+          <a:bodyPr/>
+          <a:lstStyle/>
+          <a:p>
+            <a:r>
+              <a:rPr lang="sr-Latn-CS" dirty="0" smtClean="0"/>
+              <a:t>Flex</a:t>
+            </a:r>
+            <a:endParaRPr lang="en-US" dirty="0"/>
+          </a:p>
+        </p:txBody>
+      </p:sp>
+      <p:pic>
+        <p:nvPicPr>
+          <p:cNvPr id="2050" name="Picture 2" descr="https://mdn.mozillademos.org/files/13408/flexbox-example2.png"/>
+          <p:cNvPicPr>
+            <a:picLocks noGrp="1" noChangeAspect="1" noChangeArrowheads="1"/>
+          </p:cNvPicPr>
+          <p:nvPr>
+            <p:ph sz="quarter" idx="10"/>
+          </p:nvPr>
+        </p:nvPicPr>
+        <p:blipFill>
+          <a:blip r:embed="rId2">
+            <a:extLst>
+              <a:ext uri="{28A0092B-C50C-407E-A947-70E740481C1C}">
+                <a14:useLocalDpi xmlns:a14="http://schemas.microsoft.com/office/drawing/2010/main" val="0"/>
+              </a:ext>
+            </a:extLst>
+          </a:blip>
+          <a:srcRect/>
+          <a:stretch>
+            <a:fillRect/>
+          </a:stretch>
+        </p:blipFill>
+        <p:spPr bwMode="auto">
+          <a:xfrm>
+            <a:off x="1313656" y="2032794"/>
+            <a:ext cx="7620000" cy="3314700"/>
+          </a:xfrm>
+          <a:prstGeom prst="rect">
+            <a:avLst/>
+          </a:prstGeom>
+          <a:noFill/>
+          <a:extLst>
+            <a:ext uri="{909E8E84-426E-40DD-AFC4-6F175D3DCCD1}">
+              <a14:hiddenFill xmlns:a14="http://schemas.microsoft.com/office/drawing/2010/main">
+                <a:solidFill>
+                  <a:srgbClr val="FFFFFF"/>
+                </a:solidFill>
+              </a14:hiddenFill>
+            </a:ext>
+          </a:extLst>
+        </p:spPr>
+      </p:pic>
+    </p:spTree>
+    <p:extLst>
+      <p:ext uri="{BB962C8B-B14F-4D97-AF65-F5344CB8AC3E}">
+        <p14:creationId xmlns:p14="http://schemas.microsoft.com/office/powerpoint/2010/main" val="3976683226"/>
+      </p:ext>
+    </p:extLst>
+  </p:cSld>
+  <p:clrMapOvr>
+    <a:masterClrMapping/>
+  </p:clrMapOvr>
+</p:sld>
+</file>
+
+<file path=ppt/slides/slide9.xml><?xml version="1.0" encoding="utf-8"?>
+<p:sld xmlns:a="http://schemas.openxmlformats.org/drawingml/2006/main" xmlns:r="http://schemas.openxmlformats.org/officeDocument/2006/relationships" xmlns:p="http://schemas.openxmlformats.org/presentationml/2006/main">
+  <p:cSld>
+    <p:spTree>
+      <p:nvGrpSpPr>
+        <p:cNvPr id="1" name=""/>
+        <p:cNvGrpSpPr/>
+        <p:nvPr/>
+      </p:nvGrpSpPr>
+      <p:grpSpPr>
+        <a:xfrm>
+          <a:off x="0" y="0"/>
+          <a:ext cx="0" cy="0"/>
+          <a:chOff x="0" y="0"/>
+          <a:chExt cx="0" cy="0"/>
+        </a:xfrm>
+      </p:grpSpPr>
+      <p:sp>
+        <p:nvSpPr>
+          <p:cNvPr id="5" name="Title 4"/>
+          <p:cNvSpPr>
+            <a:spLocks noGrp="1"/>
+          </p:cNvSpPr>
+          <p:nvPr>
+            <p:ph type="title"/>
+          </p:nvPr>
+        </p:nvSpPr>
+        <p:spPr/>
+        <p:txBody>
+          <a:bodyPr/>
+          <a:lstStyle/>
+          <a:p>
+            <a:r>
+              <a:rPr lang="sr-Latn-CS" dirty="0" smtClean="0"/>
+              <a:t>Flex</a:t>
+            </a:r>
+            <a:endParaRPr lang="en-US" dirty="0"/>
+          </a:p>
+        </p:txBody>
+      </p:sp>
+      <p:sp>
+        <p:nvSpPr>
+          <p:cNvPr id="3" name="Content Placeholder 2"/>
+          <p:cNvSpPr>
+            <a:spLocks noGrp="1"/>
+          </p:cNvSpPr>
+          <p:nvPr>
+            <p:ph sz="quarter" idx="10"/>
+          </p:nvPr>
+        </p:nvSpPr>
+        <p:spPr/>
+        <p:txBody>
+          <a:bodyPr/>
+          <a:lstStyle/>
+          <a:p>
+            <a:endParaRPr lang="en-US"/>
+          </a:p>
+        </p:txBody>
+      </p:sp>
+    </p:spTree>
+    <p:extLst>
+      <p:ext uri="{BB962C8B-B14F-4D97-AF65-F5344CB8AC3E}">
+        <p14:creationId xmlns:p14="http://schemas.microsoft.com/office/powerpoint/2010/main" val="1222259653"/>
+      </p:ext>
+    </p:extLst>
+  </p:cSld>
+  <p:clrMapOvr>
+    <a:masterClrMapping/>
+  </p:clrMapOvr>
 </p:sld>
 </file>
 

</xml_diff>